<commit_message>
Github link added to slides
</commit_message>
<xml_diff>
--- a/Titanic/presentation/CASINFE2018 Presentation Team Rose and Jack.pptx
+++ b/Titanic/presentation/CASINFE2018 Presentation Team Rose and Jack.pptx
@@ -200,7 +200,7 @@
           <a:p>
             <a:fld id="{4EB46E73-0DA3-DD46-84A0-BE93D3EF7A04}" type="datetimeFigureOut">
               <a:rPr lang="en-US" smtClean="0"/>
-              <a:t>11/1/18</a:t>
+              <a:t>11/2/18</a:t>
             </a:fld>
             <a:endParaRPr lang="en-US"/>
           </a:p>
@@ -467,6 +467,101 @@
 </p:notesMaster>
 </file>
 
+<file path=ppt/notesSlides/notesSlide1.xml><?xml version="1.0" encoding="utf-8"?>
+<p:notes xmlns:a="http://schemas.openxmlformats.org/drawingml/2006/main" xmlns:r="http://schemas.openxmlformats.org/officeDocument/2006/relationships" xmlns:p="http://schemas.openxmlformats.org/presentationml/2006/main">
+  <p:cSld>
+    <p:spTree>
+      <p:nvGrpSpPr>
+        <p:cNvPr id="1" name=""/>
+        <p:cNvGrpSpPr/>
+        <p:nvPr/>
+      </p:nvGrpSpPr>
+      <p:grpSpPr>
+        <a:xfrm>
+          <a:off x="0" y="0"/>
+          <a:ext cx="0" cy="0"/>
+          <a:chOff x="0" y="0"/>
+          <a:chExt cx="0" cy="0"/>
+        </a:xfrm>
+      </p:grpSpPr>
+      <p:sp>
+        <p:nvSpPr>
+          <p:cNvPr id="2" name="Slide Image Placeholder 1"/>
+          <p:cNvSpPr>
+            <a:spLocks noGrp="1" noRot="1" noChangeAspect="1"/>
+          </p:cNvSpPr>
+          <p:nvPr>
+            <p:ph type="sldImg"/>
+          </p:nvPr>
+        </p:nvSpPr>
+        <p:spPr/>
+      </p:sp>
+      <p:sp>
+        <p:nvSpPr>
+          <p:cNvPr id="3" name="Notes Placeholder 2"/>
+          <p:cNvSpPr>
+            <a:spLocks noGrp="1"/>
+          </p:cNvSpPr>
+          <p:nvPr>
+            <p:ph type="body" idx="1"/>
+          </p:nvPr>
+        </p:nvSpPr>
+        <p:spPr/>
+        <p:txBody>
+          <a:bodyPr/>
+          <a:lstStyle/>
+          <a:p>
+            <a:r>
+              <a:rPr lang="en-US" dirty="0"/>
+              <a:t>- We found </a:t>
+            </a:r>
+            <a:r>
+              <a:rPr lang="en-US" dirty="0" err="1"/>
+              <a:t>algo’s</a:t>
+            </a:r>
+            <a:r>
+              <a:rPr lang="en-US" dirty="0"/>
+              <a:t> that </a:t>
+            </a:r>
+          </a:p>
+        </p:txBody>
+      </p:sp>
+      <p:sp>
+        <p:nvSpPr>
+          <p:cNvPr id="4" name="Slide Number Placeholder 3"/>
+          <p:cNvSpPr>
+            <a:spLocks noGrp="1"/>
+          </p:cNvSpPr>
+          <p:nvPr>
+            <p:ph type="sldNum" sz="quarter" idx="5"/>
+          </p:nvPr>
+        </p:nvSpPr>
+        <p:spPr/>
+        <p:txBody>
+          <a:bodyPr/>
+          <a:lstStyle/>
+          <a:p>
+            <a:fld id="{534446F7-47C8-D749-9650-54055906893F}" type="slidenum">
+              <a:rPr lang="en-US" smtClean="0"/>
+              <a:t>3</a:t>
+            </a:fld>
+            <a:endParaRPr lang="en-US"/>
+          </a:p>
+        </p:txBody>
+      </p:sp>
+    </p:spTree>
+    <p:extLst>
+      <p:ext uri="{BB962C8B-B14F-4D97-AF65-F5344CB8AC3E}">
+        <p14:creationId xmlns:p14="http://schemas.microsoft.com/office/powerpoint/2010/main" val="3239731687"/>
+      </p:ext>
+    </p:extLst>
+  </p:cSld>
+  <p:clrMapOvr>
+    <a:masterClrMapping/>
+  </p:clrMapOvr>
+</p:notes>
+</file>
+
 <file path=ppt/slideLayouts/slideLayout1.xml><?xml version="1.0" encoding="utf-8"?>
 <p:sldLayout xmlns:a="http://schemas.openxmlformats.org/drawingml/2006/main" xmlns:r="http://schemas.openxmlformats.org/officeDocument/2006/relationships" xmlns:p="http://schemas.openxmlformats.org/presentationml/2006/main" type="title" preserve="1">
   <p:cSld name="Title Slide">
@@ -614,7 +709,7 @@
           <a:p>
             <a:fld id="{9A2B2A1C-1DF2-1B4B-B7DD-698848C29C1C}" type="datetime3">
               <a:rPr lang="en-US" smtClean="0"/>
-              <a:t>1 November 2018</a:t>
+              <a:t>2 November 2018</a:t>
             </a:fld>
             <a:endParaRPr lang="en-US"/>
           </a:p>
@@ -815,7 +910,7 @@
           <a:p>
             <a:fld id="{CA24091D-8067-9940-89DC-3EE21E9081F0}" type="datetime3">
               <a:rPr lang="en-US" smtClean="0"/>
-              <a:t>1 November 2018</a:t>
+              <a:t>2 November 2018</a:t>
             </a:fld>
             <a:endParaRPr lang="en-US"/>
           </a:p>
@@ -1026,7 +1121,7 @@
           <a:p>
             <a:fld id="{2E53E440-D541-454C-B969-8C951984ACCB}" type="datetime3">
               <a:rPr lang="en-US" smtClean="0"/>
-              <a:t>1 November 2018</a:t>
+              <a:t>2 November 2018</a:t>
             </a:fld>
             <a:endParaRPr lang="en-US"/>
           </a:p>
@@ -1227,7 +1322,7 @@
           <a:p>
             <a:fld id="{BDEB6667-082C-6442-B428-AAE56B1010DF}" type="datetime3">
               <a:rPr lang="en-US" smtClean="0"/>
-              <a:t>1 November 2018</a:t>
+              <a:t>2 November 2018</a:t>
             </a:fld>
             <a:endParaRPr lang="en-US"/>
           </a:p>
@@ -1505,7 +1600,7 @@
           <a:p>
             <a:fld id="{82E468DE-5BC0-2F46-8E9E-439D32D45DE9}" type="datetime3">
               <a:rPr lang="en-US" smtClean="0"/>
-              <a:t>1 November 2018</a:t>
+              <a:t>2 November 2018</a:t>
             </a:fld>
             <a:endParaRPr lang="en-US"/>
           </a:p>
@@ -1773,7 +1868,7 @@
           <a:p>
             <a:fld id="{192CF205-FBA2-9941-9C1F-90C83896CA55}" type="datetime3">
               <a:rPr lang="en-US" smtClean="0"/>
-              <a:t>1 November 2018</a:t>
+              <a:t>2 November 2018</a:t>
             </a:fld>
             <a:endParaRPr lang="en-US"/>
           </a:p>
@@ -2188,7 +2283,7 @@
           <a:p>
             <a:fld id="{511E9CDC-985E-1F41-AE50-C9884EAB9E4C}" type="datetime3">
               <a:rPr lang="en-US" smtClean="0"/>
-              <a:t>1 November 2018</a:t>
+              <a:t>2 November 2018</a:t>
             </a:fld>
             <a:endParaRPr lang="en-US"/>
           </a:p>
@@ -2332,7 +2427,7 @@
           <a:p>
             <a:fld id="{0959E070-C445-134A-96D7-AAC67A60A3AD}" type="datetime3">
               <a:rPr lang="en-US" smtClean="0"/>
-              <a:t>1 November 2018</a:t>
+              <a:t>2 November 2018</a:t>
             </a:fld>
             <a:endParaRPr lang="en-US"/>
           </a:p>
@@ -2448,7 +2543,7 @@
           <a:p>
             <a:fld id="{7E315F64-BB67-5A4C-B166-63448222AC7F}" type="datetime3">
               <a:rPr lang="en-US" smtClean="0"/>
-              <a:t>1 November 2018</a:t>
+              <a:t>2 November 2018</a:t>
             </a:fld>
             <a:endParaRPr lang="en-US"/>
           </a:p>
@@ -2762,7 +2857,7 @@
           <a:p>
             <a:fld id="{85E71DF1-2ADF-5D47-818D-0CA7E21A5EAE}" type="datetime3">
               <a:rPr lang="en-US" smtClean="0"/>
-              <a:t>1 November 2018</a:t>
+              <a:t>2 November 2018</a:t>
             </a:fld>
             <a:endParaRPr lang="en-US"/>
           </a:p>
@@ -3053,7 +3148,7 @@
           <a:p>
             <a:fld id="{DDD1EC1F-3659-754E-95EF-D2900082E2CF}" type="datetime3">
               <a:rPr lang="en-US" smtClean="0"/>
-              <a:t>1 November 2018</a:t>
+              <a:t>2 November 2018</a:t>
             </a:fld>
             <a:endParaRPr lang="en-US"/>
           </a:p>
@@ -3297,7 +3392,7 @@
           <a:p>
             <a:fld id="{48B59355-3524-3844-B802-72D7EC83B8B3}" type="datetime3">
               <a:rPr lang="en-US" smtClean="0"/>
-              <a:t>1 November 2018</a:t>
+              <a:t>2 November 2018</a:t>
             </a:fld>
             <a:endParaRPr lang="en-US"/>
           </a:p>
@@ -4000,7 +4095,7 @@
           <a:p>
             <a:fld id="{BDEB6667-082C-6442-B428-AAE56B1010DF}" type="datetime3">
               <a:rPr lang="en-US" smtClean="0"/>
-              <a:t>1 November 2018</a:t>
+              <a:t>2 November 2018</a:t>
             </a:fld>
             <a:endParaRPr lang="en-US"/>
           </a:p>
@@ -4448,6 +4543,32 @@
               <a:t> of decision tree makes things transparent</a:t>
             </a:r>
           </a:p>
+          <a:p>
+            <a:r>
+              <a:rPr lang="en-US" dirty="0"/>
+              <a:t>Source Code sunken at: </a:t>
+            </a:r>
+            <a:r>
+              <a:rPr lang="en-US" sz="2000" dirty="0"/>
+              <a:t>https://</a:t>
+            </a:r>
+            <a:r>
+              <a:rPr lang="en-US" sz="2000" dirty="0" err="1"/>
+              <a:t>github.com</a:t>
+            </a:r>
+            <a:r>
+              <a:rPr lang="en-US" sz="2000" dirty="0"/>
+              <a:t>/</a:t>
+            </a:r>
+            <a:r>
+              <a:rPr lang="en-US" sz="2000" dirty="0" err="1"/>
+              <a:t>nojetlag</a:t>
+            </a:r>
+            <a:r>
+              <a:rPr lang="en-US" sz="2000" dirty="0"/>
+              <a:t>/CASINFE2018/tree/master/Titanic</a:t>
+            </a:r>
+          </a:p>
         </p:txBody>
       </p:sp>
       <p:sp>
@@ -4473,7 +4594,7 @@
           <a:p>
             <a:fld id="{BDEB6667-082C-6442-B428-AAE56B1010DF}" type="datetime3">
               <a:rPr lang="en-US" smtClean="0"/>
-              <a:t>1 November 2018</a:t>
+              <a:t>2 November 2018</a:t>
             </a:fld>
             <a:endParaRPr lang="en-US"/>
           </a:p>
@@ -4630,11 +4751,7 @@
           <a:p>
             <a:r>
               <a:rPr lang="en-US" dirty="0"/>
-              <a:t>Taking time to </a:t>
-            </a:r>
-            <a:r>
-              <a:rPr lang="en-US"/>
-              <a:t>understand results</a:t>
+              <a:t>Taking time to understand results</a:t>
             </a:r>
           </a:p>
         </p:txBody>
@@ -4662,7 +4779,7 @@
           <a:p>
             <a:fld id="{BDEB6667-082C-6442-B428-AAE56B1010DF}" type="datetime3">
               <a:rPr lang="en-US" smtClean="0"/>
-              <a:t>1 November 2018</a:t>
+              <a:t>2 November 2018</a:t>
             </a:fld>
             <a:endParaRPr lang="en-US"/>
           </a:p>

</xml_diff>

<commit_message>
Boat Umgesetzt mit 0 bis 9
</commit_message>
<xml_diff>
--- a/Titanic/presentation/CASINFE2018 Presentation Team Rose and Jack.pptx
+++ b/Titanic/presentation/CASINFE2018 Presentation Team Rose and Jack.pptx
@@ -118,6 +118,911 @@
 </p:presentation>
 </file>
 
+<file path=ppt/revisionInfo.xml><?xml version="1.0" encoding="utf-8"?>
+<p1510:revInfo xmlns:a="http://schemas.openxmlformats.org/drawingml/2006/main" xmlns:r="http://schemas.openxmlformats.org/officeDocument/2006/relationships" xmlns:p1510="http://schemas.microsoft.com/office/powerpoint/2015/10/main">
+  <p1510:revLst>
+    <p1510:client id="{826B5C62-ABED-471A-8DB0-C1BDCCC0820B}" v="8" dt="2018-11-02T19:47:59.571"/>
+  </p1510:revLst>
+</p1510:revInfo>
+</file>
+
+<file path=ppt/changesInfos/changesInfo1.xml><?xml version="1.0" encoding="utf-8"?>
+<pc:chgInfo xmlns:a="http://schemas.openxmlformats.org/drawingml/2006/main" xmlns:r="http://schemas.openxmlformats.org/officeDocument/2006/relationships" xmlns:ac="http://schemas.microsoft.com/office/drawing/2013/main/command" xmlns:pc="http://schemas.microsoft.com/office/powerpoint/2013/main/command">
+  <pc:docChgLst>
+    <pc:chgData name="Reto Stucki" userId="b66e8fd03bbd0dea" providerId="LiveId" clId="{826B5C62-ABED-471A-8DB0-C1BDCCC0820B}"/>
+    <pc:docChg chg="undo custSel modSld">
+      <pc:chgData name="Reto Stucki" userId="b66e8fd03bbd0dea" providerId="LiveId" clId="{826B5C62-ABED-471A-8DB0-C1BDCCC0820B}" dt="2018-11-02T19:47:06.825" v="24" actId="27918"/>
+      <pc:docMkLst>
+        <pc:docMk/>
+      </pc:docMkLst>
+      <pc:sldChg chg="addSp delSp modSp">
+        <pc:chgData name="Reto Stucki" userId="b66e8fd03bbd0dea" providerId="LiveId" clId="{826B5C62-ABED-471A-8DB0-C1BDCCC0820B}" dt="2018-11-02T19:44:55.477" v="4" actId="14100"/>
+        <pc:sldMkLst>
+          <pc:docMk/>
+          <pc:sldMk cId="1633744824" sldId="257"/>
+        </pc:sldMkLst>
+        <pc:picChg chg="del">
+          <ac:chgData name="Reto Stucki" userId="b66e8fd03bbd0dea" providerId="LiveId" clId="{826B5C62-ABED-471A-8DB0-C1BDCCC0820B}" dt="2018-11-02T19:44:30.318" v="0" actId="478"/>
+          <ac:picMkLst>
+            <pc:docMk/>
+            <pc:sldMk cId="1633744824" sldId="257"/>
+            <ac:picMk id="8" creationId="{BC6ED81A-0EE7-184C-9F58-1AA7D0DCA57C}"/>
+          </ac:picMkLst>
+        </pc:picChg>
+        <pc:picChg chg="add mod">
+          <ac:chgData name="Reto Stucki" userId="b66e8fd03bbd0dea" providerId="LiveId" clId="{826B5C62-ABED-471A-8DB0-C1BDCCC0820B}" dt="2018-11-02T19:44:55.477" v="4" actId="14100"/>
+          <ac:picMkLst>
+            <pc:docMk/>
+            <pc:sldMk cId="1633744824" sldId="257"/>
+            <ac:picMk id="10" creationId="{5BD76E57-D609-4EB0-A200-19AC0E614270}"/>
+          </ac:picMkLst>
+        </pc:picChg>
+      </pc:sldChg>
+      <pc:sldChg chg="addSp modSp mod">
+        <pc:chgData name="Reto Stucki" userId="b66e8fd03bbd0dea" providerId="LiveId" clId="{826B5C62-ABED-471A-8DB0-C1BDCCC0820B}" dt="2018-11-02T19:47:06.825" v="24" actId="27918"/>
+        <pc:sldMkLst>
+          <pc:docMk/>
+          <pc:sldMk cId="2442461820" sldId="258"/>
+        </pc:sldMkLst>
+        <pc:spChg chg="mod">
+          <ac:chgData name="Reto Stucki" userId="b66e8fd03bbd0dea" providerId="LiveId" clId="{826B5C62-ABED-471A-8DB0-C1BDCCC0820B}" dt="2018-11-02T19:46:22.758" v="18" actId="14100"/>
+          <ac:spMkLst>
+            <pc:docMk/>
+            <pc:sldMk cId="2442461820" sldId="258"/>
+            <ac:spMk id="3" creationId="{E78E2E21-E1FA-D646-8FE8-E7935F91715A}"/>
+          </ac:spMkLst>
+        </pc:spChg>
+        <pc:graphicFrameChg chg="add mod">
+          <ac:chgData name="Reto Stucki" userId="b66e8fd03bbd0dea" providerId="LiveId" clId="{826B5C62-ABED-471A-8DB0-C1BDCCC0820B}" dt="2018-11-02T19:46:34.834" v="21" actId="1076"/>
+          <ac:graphicFrameMkLst>
+            <pc:docMk/>
+            <pc:sldMk cId="2442461820" sldId="258"/>
+            <ac:graphicFrameMk id="9" creationId="{17ED1792-042D-4BD3-AAE5-CDF640014BC7}"/>
+          </ac:graphicFrameMkLst>
+        </pc:graphicFrameChg>
+      </pc:sldChg>
+    </pc:docChg>
+  </pc:docChgLst>
+</pc:chgInfo>
+</file>
+
+<file path=ppt/charts/chart1.xml><?xml version="1.0" encoding="utf-8"?>
+<c:chartSpace xmlns:c="http://schemas.openxmlformats.org/drawingml/2006/chart" xmlns:a="http://schemas.openxmlformats.org/drawingml/2006/main" xmlns:r="http://schemas.openxmlformats.org/officeDocument/2006/relationships" xmlns:c16r2="http://schemas.microsoft.com/office/drawing/2015/06/chart">
+  <c:date1904 val="0"/>
+  <c:lang val="de-DE"/>
+  <c:roundedCorners val="0"/>
+  <mc:AlternateContent xmlns:mc="http://schemas.openxmlformats.org/markup-compatibility/2006">
+    <mc:Choice xmlns:c14="http://schemas.microsoft.com/office/drawing/2007/8/2/chart" Requires="c14">
+      <c14:style val="102"/>
+    </mc:Choice>
+    <mc:Fallback>
+      <c:style val="2"/>
+    </mc:Fallback>
+  </mc:AlternateContent>
+  <c:chart>
+    <c:autoTitleDeleted val="1"/>
+    <c:plotArea>
+      <c:layout/>
+      <c:lineChart>
+        <c:grouping val="standard"/>
+        <c:varyColors val="0"/>
+        <c:ser>
+          <c:idx val="0"/>
+          <c:order val="0"/>
+          <c:tx>
+            <c:strRef>
+              <c:f>Tabelle1!$B$1</c:f>
+              <c:strCache>
+                <c:ptCount val="1"/>
+                <c:pt idx="0">
+                  <c:v>Score</c:v>
+                </c:pt>
+              </c:strCache>
+            </c:strRef>
+          </c:tx>
+          <c:spPr>
+            <a:ln w="28575" cap="rnd">
+              <a:solidFill>
+                <a:schemeClr val="accent1"/>
+              </a:solidFill>
+              <a:round/>
+            </a:ln>
+            <a:effectLst/>
+          </c:spPr>
+          <c:marker>
+            <c:symbol val="none"/>
+          </c:marker>
+          <c:cat>
+            <c:numRef>
+              <c:f>Tabelle1!$A$2:$A$9</c:f>
+              <c:numCache>
+                <c:formatCode>General</c:formatCode>
+                <c:ptCount val="8"/>
+                <c:pt idx="0">
+                  <c:v>1</c:v>
+                </c:pt>
+                <c:pt idx="1">
+                  <c:v>2</c:v>
+                </c:pt>
+                <c:pt idx="2">
+                  <c:v>3</c:v>
+                </c:pt>
+                <c:pt idx="3">
+                  <c:v>4</c:v>
+                </c:pt>
+                <c:pt idx="4">
+                  <c:v>5</c:v>
+                </c:pt>
+                <c:pt idx="5">
+                  <c:v>6</c:v>
+                </c:pt>
+                <c:pt idx="6">
+                  <c:v>7</c:v>
+                </c:pt>
+                <c:pt idx="7">
+                  <c:v>8</c:v>
+                </c:pt>
+              </c:numCache>
+            </c:numRef>
+          </c:cat>
+          <c:val>
+            <c:numRef>
+              <c:f>Tabelle1!$B$2:$B$9</c:f>
+              <c:numCache>
+                <c:formatCode>General</c:formatCode>
+                <c:ptCount val="8"/>
+                <c:pt idx="0">
+                  <c:v>0.77777777777777701</c:v>
+                </c:pt>
+                <c:pt idx="1">
+                  <c:v>0.79310344827586199</c:v>
+                </c:pt>
+                <c:pt idx="2">
+                  <c:v>0.81992337164750895</c:v>
+                </c:pt>
+                <c:pt idx="3">
+                  <c:v>0.81226053639846696</c:v>
+                </c:pt>
+                <c:pt idx="4">
+                  <c:v>0.79310344827586199</c:v>
+                </c:pt>
+                <c:pt idx="5">
+                  <c:v>0.80842911877394596</c:v>
+                </c:pt>
+                <c:pt idx="6">
+                  <c:v>0.79310344827586199</c:v>
+                </c:pt>
+                <c:pt idx="7">
+                  <c:v>0.79310344827586199</c:v>
+                </c:pt>
+              </c:numCache>
+            </c:numRef>
+          </c:val>
+          <c:smooth val="0"/>
+          <c:extLst>
+            <c:ext xmlns:c16="http://schemas.microsoft.com/office/drawing/2014/chart" uri="{C3380CC4-5D6E-409C-BE32-E72D297353CC}">
+              <c16:uniqueId val="{00000000-3C3E-478D-B840-62695C1BDD61}"/>
+            </c:ext>
+          </c:extLst>
+        </c:ser>
+        <c:dLbls>
+          <c:showLegendKey val="0"/>
+          <c:showVal val="0"/>
+          <c:showCatName val="0"/>
+          <c:showSerName val="0"/>
+          <c:showPercent val="0"/>
+          <c:showBubbleSize val="0"/>
+        </c:dLbls>
+        <c:smooth val="0"/>
+        <c:axId val="388073296"/>
+        <c:axId val="388071000"/>
+      </c:lineChart>
+      <c:catAx>
+        <c:axId val="388073296"/>
+        <c:scaling>
+          <c:orientation val="minMax"/>
+        </c:scaling>
+        <c:delete val="0"/>
+        <c:axPos val="b"/>
+        <c:numFmt formatCode="General" sourceLinked="1"/>
+        <c:majorTickMark val="none"/>
+        <c:minorTickMark val="none"/>
+        <c:tickLblPos val="nextTo"/>
+        <c:spPr>
+          <a:noFill/>
+          <a:ln w="9525" cap="flat" cmpd="sng" algn="ctr">
+            <a:solidFill>
+              <a:schemeClr val="tx1">
+                <a:lumMod val="15000"/>
+                <a:lumOff val="85000"/>
+              </a:schemeClr>
+            </a:solidFill>
+            <a:round/>
+          </a:ln>
+          <a:effectLst/>
+        </c:spPr>
+        <c:txPr>
+          <a:bodyPr rot="-60000000" spcFirstLastPara="1" vertOverflow="ellipsis" vert="horz" wrap="square" anchor="ctr" anchorCtr="1"/>
+          <a:lstStyle/>
+          <a:p>
+            <a:pPr>
+              <a:defRPr sz="1197" b="0" i="0" u="none" strike="noStrike" kern="1200" baseline="0">
+                <a:solidFill>
+                  <a:schemeClr val="tx1">
+                    <a:lumMod val="65000"/>
+                    <a:lumOff val="35000"/>
+                  </a:schemeClr>
+                </a:solidFill>
+                <a:latin typeface="+mn-lt"/>
+                <a:ea typeface="+mn-ea"/>
+                <a:cs typeface="+mn-cs"/>
+              </a:defRPr>
+            </a:pPr>
+            <a:endParaRPr lang="de-DE"/>
+          </a:p>
+        </c:txPr>
+        <c:crossAx val="388071000"/>
+        <c:crosses val="autoZero"/>
+        <c:auto val="1"/>
+        <c:lblAlgn val="ctr"/>
+        <c:lblOffset val="100"/>
+        <c:noMultiLvlLbl val="0"/>
+      </c:catAx>
+      <c:valAx>
+        <c:axId val="388071000"/>
+        <c:scaling>
+          <c:orientation val="minMax"/>
+          <c:min val="0.77"/>
+        </c:scaling>
+        <c:delete val="0"/>
+        <c:axPos val="l"/>
+        <c:majorGridlines>
+          <c:spPr>
+            <a:ln w="9525" cap="flat" cmpd="sng" algn="ctr">
+              <a:solidFill>
+                <a:schemeClr val="tx1">
+                  <a:lumMod val="15000"/>
+                  <a:lumOff val="85000"/>
+                </a:schemeClr>
+              </a:solidFill>
+              <a:round/>
+            </a:ln>
+            <a:effectLst/>
+          </c:spPr>
+        </c:majorGridlines>
+        <c:numFmt formatCode="General" sourceLinked="1"/>
+        <c:majorTickMark val="none"/>
+        <c:minorTickMark val="none"/>
+        <c:tickLblPos val="nextTo"/>
+        <c:spPr>
+          <a:noFill/>
+          <a:ln>
+            <a:noFill/>
+          </a:ln>
+          <a:effectLst/>
+        </c:spPr>
+        <c:txPr>
+          <a:bodyPr rot="-60000000" spcFirstLastPara="1" vertOverflow="ellipsis" vert="horz" wrap="square" anchor="ctr" anchorCtr="1"/>
+          <a:lstStyle/>
+          <a:p>
+            <a:pPr>
+              <a:defRPr sz="1197" b="0" i="0" u="none" strike="noStrike" kern="1200" baseline="0">
+                <a:solidFill>
+                  <a:schemeClr val="tx1">
+                    <a:lumMod val="65000"/>
+                    <a:lumOff val="35000"/>
+                  </a:schemeClr>
+                </a:solidFill>
+                <a:latin typeface="+mn-lt"/>
+                <a:ea typeface="+mn-ea"/>
+                <a:cs typeface="+mn-cs"/>
+              </a:defRPr>
+            </a:pPr>
+            <a:endParaRPr lang="de-DE"/>
+          </a:p>
+        </c:txPr>
+        <c:crossAx val="388073296"/>
+        <c:crosses val="autoZero"/>
+        <c:crossBetween val="between"/>
+      </c:valAx>
+      <c:spPr>
+        <a:noFill/>
+        <a:ln>
+          <a:noFill/>
+        </a:ln>
+        <a:effectLst/>
+      </c:spPr>
+    </c:plotArea>
+    <c:plotVisOnly val="1"/>
+    <c:dispBlanksAs val="gap"/>
+    <c:extLst>
+      <c:ext xmlns:c16r3="http://schemas.microsoft.com/office/drawing/2017/03/chart" uri="{56B9EC1D-385E-4148-901F-78D8002777C0}">
+        <c16r3:dataDisplayOptions16>
+          <c16r3:dispNaAsBlank val="1"/>
+        </c16r3:dataDisplayOptions16>
+      </c:ext>
+    </c:extLst>
+    <c:showDLblsOverMax val="0"/>
+  </c:chart>
+  <c:spPr>
+    <a:noFill/>
+    <a:ln>
+      <a:noFill/>
+    </a:ln>
+    <a:effectLst/>
+  </c:spPr>
+  <c:txPr>
+    <a:bodyPr/>
+    <a:lstStyle/>
+    <a:p>
+      <a:pPr>
+        <a:defRPr/>
+      </a:pPr>
+      <a:endParaRPr lang="de-DE"/>
+    </a:p>
+  </c:txPr>
+  <c:externalData r:id="rId3">
+    <c:autoUpdate val="0"/>
+  </c:externalData>
+</c:chartSpace>
+</file>
+
+<file path=ppt/charts/colors1.xml><?xml version="1.0" encoding="utf-8"?>
+<cs:colorStyle xmlns:cs="http://schemas.microsoft.com/office/drawing/2012/chartStyle" xmlns:a="http://schemas.openxmlformats.org/drawingml/2006/main" meth="cycle" id="10">
+  <a:schemeClr val="accent1"/>
+  <a:schemeClr val="accent2"/>
+  <a:schemeClr val="accent3"/>
+  <a:schemeClr val="accent4"/>
+  <a:schemeClr val="accent5"/>
+  <a:schemeClr val="accent6"/>
+  <cs:variation/>
+  <cs:variation>
+    <a:lumMod val="60000"/>
+  </cs:variation>
+  <cs:variation>
+    <a:lumMod val="80000"/>
+    <a:lumOff val="20000"/>
+  </cs:variation>
+  <cs:variation>
+    <a:lumMod val="80000"/>
+  </cs:variation>
+  <cs:variation>
+    <a:lumMod val="60000"/>
+    <a:lumOff val="40000"/>
+  </cs:variation>
+  <cs:variation>
+    <a:lumMod val="50000"/>
+  </cs:variation>
+  <cs:variation>
+    <a:lumMod val="70000"/>
+    <a:lumOff val="30000"/>
+  </cs:variation>
+  <cs:variation>
+    <a:lumMod val="70000"/>
+  </cs:variation>
+  <cs:variation>
+    <a:lumMod val="50000"/>
+    <a:lumOff val="50000"/>
+  </cs:variation>
+</cs:colorStyle>
+</file>
+
+<file path=ppt/charts/style1.xml><?xml version="1.0" encoding="utf-8"?>
+<cs:chartStyle xmlns:cs="http://schemas.microsoft.com/office/drawing/2012/chartStyle" xmlns:a="http://schemas.openxmlformats.org/drawingml/2006/main" id="227">
+  <cs:axisTitle>
+    <cs:lnRef idx="0"/>
+    <cs:fillRef idx="0"/>
+    <cs:effectRef idx="0"/>
+    <cs:fontRef idx="minor">
+      <a:schemeClr val="tx1">
+        <a:lumMod val="65000"/>
+        <a:lumOff val="35000"/>
+      </a:schemeClr>
+    </cs:fontRef>
+    <cs:defRPr sz="1330" kern="1200"/>
+  </cs:axisTitle>
+  <cs:categoryAxis>
+    <cs:lnRef idx="0"/>
+    <cs:fillRef idx="0"/>
+    <cs:effectRef idx="0"/>
+    <cs:fontRef idx="minor">
+      <a:schemeClr val="tx1">
+        <a:lumMod val="65000"/>
+        <a:lumOff val="35000"/>
+      </a:schemeClr>
+    </cs:fontRef>
+    <cs:spPr>
+      <a:ln w="9525" cap="flat" cmpd="sng" algn="ctr">
+        <a:solidFill>
+          <a:schemeClr val="tx1">
+            <a:lumMod val="15000"/>
+            <a:lumOff val="85000"/>
+          </a:schemeClr>
+        </a:solidFill>
+        <a:round/>
+      </a:ln>
+    </cs:spPr>
+    <cs:defRPr sz="1197" kern="1200"/>
+  </cs:categoryAxis>
+  <cs:chartArea mods="allowNoFillOverride allowNoLineOverride">
+    <cs:lnRef idx="0"/>
+    <cs:fillRef idx="0"/>
+    <cs:effectRef idx="0"/>
+    <cs:fontRef idx="minor">
+      <a:schemeClr val="tx1"/>
+    </cs:fontRef>
+    <cs:spPr>
+      <a:solidFill>
+        <a:schemeClr val="bg1"/>
+      </a:solidFill>
+      <a:ln w="9525" cap="flat" cmpd="sng" algn="ctr">
+        <a:solidFill>
+          <a:schemeClr val="tx1">
+            <a:lumMod val="15000"/>
+            <a:lumOff val="85000"/>
+          </a:schemeClr>
+        </a:solidFill>
+        <a:round/>
+      </a:ln>
+    </cs:spPr>
+    <cs:defRPr sz="1330" kern="1200"/>
+  </cs:chartArea>
+  <cs:dataLabel>
+    <cs:lnRef idx="0"/>
+    <cs:fillRef idx="0"/>
+    <cs:effectRef idx="0"/>
+    <cs:fontRef idx="minor">
+      <a:schemeClr val="tx1">
+        <a:lumMod val="75000"/>
+        <a:lumOff val="25000"/>
+      </a:schemeClr>
+    </cs:fontRef>
+    <cs:defRPr sz="1197" kern="1200"/>
+  </cs:dataLabel>
+  <cs:dataLabelCallout>
+    <cs:lnRef idx="0"/>
+    <cs:fillRef idx="0"/>
+    <cs:effectRef idx="0"/>
+    <cs:fontRef idx="minor">
+      <a:schemeClr val="dk1">
+        <a:lumMod val="65000"/>
+        <a:lumOff val="35000"/>
+      </a:schemeClr>
+    </cs:fontRef>
+    <cs:spPr>
+      <a:solidFill>
+        <a:schemeClr val="lt1"/>
+      </a:solidFill>
+      <a:ln>
+        <a:solidFill>
+          <a:schemeClr val="dk1">
+            <a:lumMod val="25000"/>
+            <a:lumOff val="75000"/>
+          </a:schemeClr>
+        </a:solidFill>
+      </a:ln>
+    </cs:spPr>
+    <cs:defRPr sz="1197" kern="1200"/>
+    <cs:bodyPr rot="0" spcFirstLastPara="1" vertOverflow="clip" horzOverflow="clip" vert="horz" wrap="square" lIns="36576" tIns="18288" rIns="36576" bIns="18288" anchor="ctr" anchorCtr="1">
+      <a:spAutoFit/>
+    </cs:bodyPr>
+  </cs:dataLabelCallout>
+  <cs:dataPoint>
+    <cs:lnRef idx="0"/>
+    <cs:fillRef idx="1">
+      <cs:styleClr val="auto"/>
+    </cs:fillRef>
+    <cs:effectRef idx="0"/>
+    <cs:fontRef idx="minor">
+      <a:schemeClr val="tx1"/>
+    </cs:fontRef>
+    <cs:spPr>
+      <a:solidFill>
+        <a:schemeClr val="phClr"/>
+      </a:solidFill>
+    </cs:spPr>
+  </cs:dataPoint>
+  <cs:dataPoint3D>
+    <cs:lnRef idx="0"/>
+    <cs:fillRef idx="1">
+      <cs:styleClr val="auto"/>
+    </cs:fillRef>
+    <cs:effectRef idx="0"/>
+    <cs:fontRef idx="minor">
+      <a:schemeClr val="tx1"/>
+    </cs:fontRef>
+    <cs:spPr>
+      <a:solidFill>
+        <a:schemeClr val="phClr"/>
+      </a:solidFill>
+    </cs:spPr>
+  </cs:dataPoint3D>
+  <cs:dataPointLine>
+    <cs:lnRef idx="0">
+      <cs:styleClr val="auto"/>
+    </cs:lnRef>
+    <cs:fillRef idx="1"/>
+    <cs:effectRef idx="0"/>
+    <cs:fontRef idx="minor">
+      <a:schemeClr val="tx1"/>
+    </cs:fontRef>
+    <cs:spPr>
+      <a:ln w="28575" cap="rnd">
+        <a:solidFill>
+          <a:schemeClr val="phClr"/>
+        </a:solidFill>
+        <a:round/>
+      </a:ln>
+    </cs:spPr>
+  </cs:dataPointLine>
+  <cs:dataPointMarker>
+    <cs:lnRef idx="0">
+      <cs:styleClr val="auto"/>
+    </cs:lnRef>
+    <cs:fillRef idx="1">
+      <cs:styleClr val="auto"/>
+    </cs:fillRef>
+    <cs:effectRef idx="0"/>
+    <cs:fontRef idx="minor">
+      <a:schemeClr val="tx1"/>
+    </cs:fontRef>
+    <cs:spPr>
+      <a:solidFill>
+        <a:schemeClr val="phClr"/>
+      </a:solidFill>
+      <a:ln w="9525">
+        <a:solidFill>
+          <a:schemeClr val="phClr"/>
+        </a:solidFill>
+      </a:ln>
+    </cs:spPr>
+  </cs:dataPointMarker>
+  <cs:dataPointMarkerLayout symbol="circle" size="5"/>
+  <cs:dataPointWireframe>
+    <cs:lnRef idx="0">
+      <cs:styleClr val="auto"/>
+    </cs:lnRef>
+    <cs:fillRef idx="1"/>
+    <cs:effectRef idx="0"/>
+    <cs:fontRef idx="minor">
+      <a:schemeClr val="tx1"/>
+    </cs:fontRef>
+    <cs:spPr>
+      <a:ln w="9525" cap="rnd">
+        <a:solidFill>
+          <a:schemeClr val="phClr"/>
+        </a:solidFill>
+        <a:round/>
+      </a:ln>
+    </cs:spPr>
+  </cs:dataPointWireframe>
+  <cs:dataTable>
+    <cs:lnRef idx="0"/>
+    <cs:fillRef idx="0"/>
+    <cs:effectRef idx="0"/>
+    <cs:fontRef idx="minor">
+      <a:schemeClr val="tx1">
+        <a:lumMod val="65000"/>
+        <a:lumOff val="35000"/>
+      </a:schemeClr>
+    </cs:fontRef>
+    <cs:spPr>
+      <a:noFill/>
+      <a:ln w="9525" cap="flat" cmpd="sng" algn="ctr">
+        <a:solidFill>
+          <a:schemeClr val="tx1">
+            <a:lumMod val="15000"/>
+            <a:lumOff val="85000"/>
+          </a:schemeClr>
+        </a:solidFill>
+        <a:round/>
+      </a:ln>
+    </cs:spPr>
+    <cs:defRPr sz="1197" kern="1200"/>
+  </cs:dataTable>
+  <cs:downBar>
+    <cs:lnRef idx="0"/>
+    <cs:fillRef idx="0"/>
+    <cs:effectRef idx="0"/>
+    <cs:fontRef idx="minor">
+      <a:schemeClr val="dk1"/>
+    </cs:fontRef>
+    <cs:spPr>
+      <a:solidFill>
+        <a:schemeClr val="dk1">
+          <a:lumMod val="65000"/>
+          <a:lumOff val="35000"/>
+        </a:schemeClr>
+      </a:solidFill>
+      <a:ln w="9525">
+        <a:solidFill>
+          <a:schemeClr val="tx1">
+            <a:lumMod val="65000"/>
+            <a:lumOff val="35000"/>
+          </a:schemeClr>
+        </a:solidFill>
+      </a:ln>
+    </cs:spPr>
+  </cs:downBar>
+  <cs:dropLine>
+    <cs:lnRef idx="0"/>
+    <cs:fillRef idx="0"/>
+    <cs:effectRef idx="0"/>
+    <cs:fontRef idx="minor">
+      <a:schemeClr val="tx1"/>
+    </cs:fontRef>
+    <cs:spPr>
+      <a:ln w="9525" cap="flat" cmpd="sng" algn="ctr">
+        <a:solidFill>
+          <a:schemeClr val="tx1">
+            <a:lumMod val="35000"/>
+            <a:lumOff val="65000"/>
+          </a:schemeClr>
+        </a:solidFill>
+        <a:round/>
+      </a:ln>
+    </cs:spPr>
+  </cs:dropLine>
+  <cs:errorBar>
+    <cs:lnRef idx="0"/>
+    <cs:fillRef idx="0"/>
+    <cs:effectRef idx="0"/>
+    <cs:fontRef idx="minor">
+      <a:schemeClr val="tx1"/>
+    </cs:fontRef>
+    <cs:spPr>
+      <a:ln w="9525" cap="flat" cmpd="sng" algn="ctr">
+        <a:solidFill>
+          <a:schemeClr val="tx1">
+            <a:lumMod val="65000"/>
+            <a:lumOff val="35000"/>
+          </a:schemeClr>
+        </a:solidFill>
+        <a:round/>
+      </a:ln>
+    </cs:spPr>
+  </cs:errorBar>
+  <cs:floor>
+    <cs:lnRef idx="0"/>
+    <cs:fillRef idx="0"/>
+    <cs:effectRef idx="0"/>
+    <cs:fontRef idx="minor">
+      <a:schemeClr val="tx1"/>
+    </cs:fontRef>
+    <cs:spPr>
+      <a:noFill/>
+      <a:ln>
+        <a:noFill/>
+      </a:ln>
+    </cs:spPr>
+  </cs:floor>
+  <cs:gridlineMajor>
+    <cs:lnRef idx="0"/>
+    <cs:fillRef idx="0"/>
+    <cs:effectRef idx="0"/>
+    <cs:fontRef idx="minor">
+      <a:schemeClr val="tx1"/>
+    </cs:fontRef>
+    <cs:spPr>
+      <a:ln w="9525" cap="flat" cmpd="sng" algn="ctr">
+        <a:solidFill>
+          <a:schemeClr val="tx1">
+            <a:lumMod val="15000"/>
+            <a:lumOff val="85000"/>
+          </a:schemeClr>
+        </a:solidFill>
+        <a:round/>
+      </a:ln>
+    </cs:spPr>
+  </cs:gridlineMajor>
+  <cs:gridlineMinor>
+    <cs:lnRef idx="0"/>
+    <cs:fillRef idx="0"/>
+    <cs:effectRef idx="0"/>
+    <cs:fontRef idx="minor">
+      <a:schemeClr val="tx1"/>
+    </cs:fontRef>
+    <cs:spPr>
+      <a:ln w="9525" cap="flat" cmpd="sng" algn="ctr">
+        <a:solidFill>
+          <a:schemeClr val="tx1">
+            <a:lumMod val="5000"/>
+            <a:lumOff val="95000"/>
+          </a:schemeClr>
+        </a:solidFill>
+        <a:round/>
+      </a:ln>
+    </cs:spPr>
+  </cs:gridlineMinor>
+  <cs:hiLoLine>
+    <cs:lnRef idx="0"/>
+    <cs:fillRef idx="0"/>
+    <cs:effectRef idx="0"/>
+    <cs:fontRef idx="minor">
+      <a:schemeClr val="tx1"/>
+    </cs:fontRef>
+    <cs:spPr>
+      <a:ln w="9525" cap="flat" cmpd="sng" algn="ctr">
+        <a:solidFill>
+          <a:schemeClr val="tx1">
+            <a:lumMod val="75000"/>
+            <a:lumOff val="25000"/>
+          </a:schemeClr>
+        </a:solidFill>
+        <a:round/>
+      </a:ln>
+    </cs:spPr>
+  </cs:hiLoLine>
+  <cs:leaderLine>
+    <cs:lnRef idx="0"/>
+    <cs:fillRef idx="0"/>
+    <cs:effectRef idx="0"/>
+    <cs:fontRef idx="minor">
+      <a:schemeClr val="tx1"/>
+    </cs:fontRef>
+    <cs:spPr>
+      <a:ln w="9525" cap="flat" cmpd="sng" algn="ctr">
+        <a:solidFill>
+          <a:schemeClr val="tx1">
+            <a:lumMod val="35000"/>
+            <a:lumOff val="65000"/>
+          </a:schemeClr>
+        </a:solidFill>
+        <a:round/>
+      </a:ln>
+    </cs:spPr>
+  </cs:leaderLine>
+  <cs:legend>
+    <cs:lnRef idx="0"/>
+    <cs:fillRef idx="0"/>
+    <cs:effectRef idx="0"/>
+    <cs:fontRef idx="minor">
+      <a:schemeClr val="tx1">
+        <a:lumMod val="65000"/>
+        <a:lumOff val="35000"/>
+      </a:schemeClr>
+    </cs:fontRef>
+    <cs:defRPr sz="1197" kern="1200"/>
+  </cs:legend>
+  <cs:plotArea mods="allowNoFillOverride allowNoLineOverride">
+    <cs:lnRef idx="0"/>
+    <cs:fillRef idx="0"/>
+    <cs:effectRef idx="0"/>
+    <cs:fontRef idx="minor">
+      <a:schemeClr val="tx1"/>
+    </cs:fontRef>
+  </cs:plotArea>
+  <cs:plotArea3D mods="allowNoFillOverride allowNoLineOverride">
+    <cs:lnRef idx="0"/>
+    <cs:fillRef idx="0"/>
+    <cs:effectRef idx="0"/>
+    <cs:fontRef idx="minor">
+      <a:schemeClr val="tx1"/>
+    </cs:fontRef>
+  </cs:plotArea3D>
+  <cs:seriesAxis>
+    <cs:lnRef idx="0"/>
+    <cs:fillRef idx="0"/>
+    <cs:effectRef idx="0"/>
+    <cs:fontRef idx="minor">
+      <a:schemeClr val="tx1">
+        <a:lumMod val="65000"/>
+        <a:lumOff val="35000"/>
+      </a:schemeClr>
+    </cs:fontRef>
+    <cs:defRPr sz="1197" kern="1200"/>
+  </cs:seriesAxis>
+  <cs:seriesLine>
+    <cs:lnRef idx="0"/>
+    <cs:fillRef idx="0"/>
+    <cs:effectRef idx="0"/>
+    <cs:fontRef idx="minor">
+      <a:schemeClr val="tx1"/>
+    </cs:fontRef>
+    <cs:spPr>
+      <a:ln w="9525" cap="flat" cmpd="sng" algn="ctr">
+        <a:solidFill>
+          <a:schemeClr val="tx1">
+            <a:lumMod val="35000"/>
+            <a:lumOff val="65000"/>
+          </a:schemeClr>
+        </a:solidFill>
+        <a:round/>
+      </a:ln>
+    </cs:spPr>
+  </cs:seriesLine>
+  <cs:title>
+    <cs:lnRef idx="0"/>
+    <cs:fillRef idx="0"/>
+    <cs:effectRef idx="0"/>
+    <cs:fontRef idx="minor">
+      <a:schemeClr val="tx1">
+        <a:lumMod val="65000"/>
+        <a:lumOff val="35000"/>
+      </a:schemeClr>
+    </cs:fontRef>
+    <cs:defRPr sz="1862" b="0" kern="1200" spc="0" baseline="0"/>
+  </cs:title>
+  <cs:trendline>
+    <cs:lnRef idx="0">
+      <cs:styleClr val="auto"/>
+    </cs:lnRef>
+    <cs:fillRef idx="0"/>
+    <cs:effectRef idx="0"/>
+    <cs:fontRef idx="minor">
+      <a:schemeClr val="tx1"/>
+    </cs:fontRef>
+    <cs:spPr>
+      <a:ln w="19050" cap="rnd">
+        <a:solidFill>
+          <a:schemeClr val="phClr"/>
+        </a:solidFill>
+        <a:prstDash val="sysDot"/>
+      </a:ln>
+    </cs:spPr>
+  </cs:trendline>
+  <cs:trendlineLabel>
+    <cs:lnRef idx="0"/>
+    <cs:fillRef idx="0"/>
+    <cs:effectRef idx="0"/>
+    <cs:fontRef idx="minor">
+      <a:schemeClr val="tx1">
+        <a:lumMod val="65000"/>
+        <a:lumOff val="35000"/>
+      </a:schemeClr>
+    </cs:fontRef>
+    <cs:defRPr sz="1197" kern="1200"/>
+  </cs:trendlineLabel>
+  <cs:upBar>
+    <cs:lnRef idx="0"/>
+    <cs:fillRef idx="0"/>
+    <cs:effectRef idx="0"/>
+    <cs:fontRef idx="minor">
+      <a:schemeClr val="dk1"/>
+    </cs:fontRef>
+    <cs:spPr>
+      <a:solidFill>
+        <a:schemeClr val="lt1"/>
+      </a:solidFill>
+      <a:ln w="9525">
+        <a:solidFill>
+          <a:schemeClr val="tx1">
+            <a:lumMod val="15000"/>
+            <a:lumOff val="85000"/>
+          </a:schemeClr>
+        </a:solidFill>
+      </a:ln>
+    </cs:spPr>
+  </cs:upBar>
+  <cs:valueAxis>
+    <cs:lnRef idx="0"/>
+    <cs:fillRef idx="0"/>
+    <cs:effectRef idx="0"/>
+    <cs:fontRef idx="minor">
+      <a:schemeClr val="tx1">
+        <a:lumMod val="65000"/>
+        <a:lumOff val="35000"/>
+      </a:schemeClr>
+    </cs:fontRef>
+    <cs:defRPr sz="1197" kern="1200"/>
+  </cs:valueAxis>
+  <cs:wall>
+    <cs:lnRef idx="0"/>
+    <cs:fillRef idx="0"/>
+    <cs:effectRef idx="0"/>
+    <cs:fontRef idx="minor">
+      <a:schemeClr val="tx1"/>
+    </cs:fontRef>
+    <cs:spPr>
+      <a:noFill/>
+      <a:ln>
+        <a:noFill/>
+      </a:ln>
+    </cs:spPr>
+  </cs:wall>
+</cs:chartStyle>
+</file>
+
 <file path=ppt/notesMasters/notesMaster1.xml><?xml version="1.0" encoding="utf-8"?>
 <p:notesMaster xmlns:a="http://schemas.openxmlformats.org/drawingml/2006/main" xmlns:r="http://schemas.openxmlformats.org/officeDocument/2006/relationships" xmlns:p="http://schemas.openxmlformats.org/presentationml/2006/main">
   <p:cSld>
@@ -200,7 +1105,7 @@
           <a:p>
             <a:fld id="{4EB46E73-0DA3-DD46-84A0-BE93D3EF7A04}" type="datetimeFigureOut">
               <a:rPr lang="en-US" smtClean="0"/>
-              <a:t>11/2/18</a:t>
+              <a:t>11/2/2018</a:t>
             </a:fld>
             <a:endParaRPr lang="en-US"/>
           </a:p>
@@ -358,7 +1263,7 @@
           <a:p>
             <a:fld id="{534446F7-47C8-D749-9650-54055906893F}" type="slidenum">
               <a:rPr lang="en-US" smtClean="0"/>
-              <a:t>‹#›</a:t>
+              <a:t>‹Nr.›</a:t>
             </a:fld>
             <a:endParaRPr lang="en-US"/>
           </a:p>
@@ -766,7 +1671,7 @@
           <a:p>
             <a:fld id="{BA12F91E-B0A1-014C-A1C8-3D5E51C1A17C}" type="slidenum">
               <a:rPr lang="en-US" smtClean="0"/>
-              <a:t>‹#›</a:t>
+              <a:t>‹Nr.›</a:t>
             </a:fld>
             <a:endParaRPr lang="en-US"/>
           </a:p>
@@ -967,7 +1872,7 @@
           <a:p>
             <a:fld id="{BA12F91E-B0A1-014C-A1C8-3D5E51C1A17C}" type="slidenum">
               <a:rPr lang="en-US" smtClean="0"/>
-              <a:t>‹#›</a:t>
+              <a:t>‹Nr.›</a:t>
             </a:fld>
             <a:endParaRPr lang="en-US"/>
           </a:p>
@@ -1178,7 +2083,7 @@
           <a:p>
             <a:fld id="{BA12F91E-B0A1-014C-A1C8-3D5E51C1A17C}" type="slidenum">
               <a:rPr lang="en-US" smtClean="0"/>
-              <a:t>‹#›</a:t>
+              <a:t>‹Nr.›</a:t>
             </a:fld>
             <a:endParaRPr lang="en-US"/>
           </a:p>
@@ -1379,7 +2284,7 @@
           <a:p>
             <a:fld id="{BA12F91E-B0A1-014C-A1C8-3D5E51C1A17C}" type="slidenum">
               <a:rPr lang="en-US" smtClean="0"/>
-              <a:t>‹#›</a:t>
+              <a:t>‹Nr.›</a:t>
             </a:fld>
             <a:endParaRPr lang="en-US"/>
           </a:p>
@@ -1657,7 +2562,7 @@
           <a:p>
             <a:fld id="{BA12F91E-B0A1-014C-A1C8-3D5E51C1A17C}" type="slidenum">
               <a:rPr lang="en-US" smtClean="0"/>
-              <a:t>‹#›</a:t>
+              <a:t>‹Nr.›</a:t>
             </a:fld>
             <a:endParaRPr lang="en-US"/>
           </a:p>
@@ -1925,7 +2830,7 @@
           <a:p>
             <a:fld id="{BA12F91E-B0A1-014C-A1C8-3D5E51C1A17C}" type="slidenum">
               <a:rPr lang="en-US" smtClean="0"/>
-              <a:t>‹#›</a:t>
+              <a:t>‹Nr.›</a:t>
             </a:fld>
             <a:endParaRPr lang="en-US"/>
           </a:p>
@@ -2340,7 +3245,7 @@
           <a:p>
             <a:fld id="{BA12F91E-B0A1-014C-A1C8-3D5E51C1A17C}" type="slidenum">
               <a:rPr lang="en-US" smtClean="0"/>
-              <a:t>‹#›</a:t>
+              <a:t>‹Nr.›</a:t>
             </a:fld>
             <a:endParaRPr lang="en-US"/>
           </a:p>
@@ -2484,7 +3389,7 @@
           <a:p>
             <a:fld id="{BA12F91E-B0A1-014C-A1C8-3D5E51C1A17C}" type="slidenum">
               <a:rPr lang="en-US" smtClean="0"/>
-              <a:t>‹#›</a:t>
+              <a:t>‹Nr.›</a:t>
             </a:fld>
             <a:endParaRPr lang="en-US"/>
           </a:p>
@@ -2600,7 +3505,7 @@
           <a:p>
             <a:fld id="{BA12F91E-B0A1-014C-A1C8-3D5E51C1A17C}" type="slidenum">
               <a:rPr lang="en-US" smtClean="0"/>
-              <a:t>‹#›</a:t>
+              <a:t>‹Nr.›</a:t>
             </a:fld>
             <a:endParaRPr lang="en-US"/>
           </a:p>
@@ -2914,7 +3819,7 @@
           <a:p>
             <a:fld id="{BA12F91E-B0A1-014C-A1C8-3D5E51C1A17C}" type="slidenum">
               <a:rPr lang="en-US" smtClean="0"/>
-              <a:t>‹#›</a:t>
+              <a:t>‹Nr.›</a:t>
             </a:fld>
             <a:endParaRPr lang="en-US"/>
           </a:p>
@@ -3205,7 +4110,7 @@
           <a:p>
             <a:fld id="{BA12F91E-B0A1-014C-A1C8-3D5E51C1A17C}" type="slidenum">
               <a:rPr lang="en-US" smtClean="0"/>
-              <a:t>‹#›</a:t>
+              <a:t>‹Nr.›</a:t>
             </a:fld>
             <a:endParaRPr lang="en-US"/>
           </a:p>
@@ -3485,7 +4390,7 @@
           <a:p>
             <a:fld id="{BA12F91E-B0A1-014C-A1C8-3D5E51C1A17C}" type="slidenum">
               <a:rPr lang="en-US" smtClean="0"/>
-              <a:t>‹#›</a:t>
+              <a:t>‹Nr.›</a:t>
             </a:fld>
             <a:endParaRPr lang="en-US"/>
           </a:p>
@@ -4196,42 +5101,6 @@
           </a:prstGeom>
         </p:spPr>
       </p:pic>
-      <p:pic>
-        <p:nvPicPr>
-          <p:cNvPr id="8" name="Grafik 8">
-            <a:extLst>
-              <a:ext uri="{FF2B5EF4-FFF2-40B4-BE49-F238E27FC236}">
-                <a16:creationId xmlns:a16="http://schemas.microsoft.com/office/drawing/2014/main" id="{BC6ED81A-0EE7-184C-9F58-1AA7D0DCA57C}"/>
-              </a:ext>
-            </a:extLst>
-          </p:cNvPr>
-          <p:cNvPicPr>
-            <a:picLocks noChangeAspect="1"/>
-          </p:cNvPicPr>
-          <p:nvPr/>
-        </p:nvPicPr>
-        <p:blipFill>
-          <a:blip r:embed="rId3">
-            <a:extLst>
-              <a:ext uri="{28A0092B-C50C-407E-A947-70E740481C1C}">
-                <a14:useLocalDpi xmlns:a14="http://schemas.microsoft.com/office/drawing/2010/main" val="0"/>
-              </a:ext>
-            </a:extLst>
-          </a:blip>
-          <a:stretch>
-            <a:fillRect/>
-          </a:stretch>
-        </p:blipFill>
-        <p:spPr>
-          <a:xfrm>
-            <a:off x="6380792" y="2337780"/>
-            <a:ext cx="5658807" cy="2111353"/>
-          </a:xfrm>
-          <a:prstGeom prst="rect">
-            <a:avLst/>
-          </a:prstGeom>
-        </p:spPr>
-      </p:pic>
       <p:sp>
         <p:nvSpPr>
           <p:cNvPr id="9" name="TextBox 8">
@@ -4401,6 +5270,36 @@
           </a:p>
         </p:txBody>
       </p:sp>
+      <p:pic>
+        <p:nvPicPr>
+          <p:cNvPr id="10" name="Grafik 9">
+            <a:extLst>
+              <a:ext uri="{FF2B5EF4-FFF2-40B4-BE49-F238E27FC236}">
+                <a16:creationId xmlns:a16="http://schemas.microsoft.com/office/drawing/2014/main" id="{5BD76E57-D609-4EB0-A200-19AC0E614270}"/>
+              </a:ext>
+            </a:extLst>
+          </p:cNvPr>
+          <p:cNvPicPr>
+            <a:picLocks noChangeAspect="1"/>
+          </p:cNvPicPr>
+          <p:nvPr/>
+        </p:nvPicPr>
+        <p:blipFill>
+          <a:blip r:embed="rId3"/>
+          <a:stretch>
+            <a:fillRect/>
+          </a:stretch>
+        </p:blipFill>
+        <p:spPr>
+          <a:xfrm>
+            <a:off x="6220811" y="2408868"/>
+            <a:ext cx="5600886" cy="2088740"/>
+          </a:xfrm>
+          <a:prstGeom prst="rect">
+            <a:avLst/>
+          </a:prstGeom>
+        </p:spPr>
+      </p:pic>
     </p:spTree>
     <p:extLst>
       <p:ext uri="{BB962C8B-B14F-4D97-AF65-F5344CB8AC3E}">
@@ -4476,7 +5375,12 @@
             <p:ph idx="1"/>
           </p:nvPr>
         </p:nvSpPr>
-        <p:spPr/>
+        <p:spPr>
+          <a:xfrm>
+            <a:off x="838200" y="1825625"/>
+            <a:ext cx="10515600" cy="4351338"/>
+          </a:xfrm>
+        </p:spPr>
         <p:txBody>
           <a:bodyPr/>
           <a:lstStyle/>
@@ -4657,6 +5561,34 @@
           </a:p>
         </p:txBody>
       </p:sp>
+      <p:graphicFrame>
+        <p:nvGraphicFramePr>
+          <p:cNvPr id="9" name="Diagramm 8">
+            <a:extLst>
+              <a:ext uri="{FF2B5EF4-FFF2-40B4-BE49-F238E27FC236}">
+                <a16:creationId xmlns:a16="http://schemas.microsoft.com/office/drawing/2014/main" id="{17ED1792-042D-4BD3-AAE5-CDF640014BC7}"/>
+              </a:ext>
+            </a:extLst>
+          </p:cNvPr>
+          <p:cNvGraphicFramePr/>
+          <p:nvPr>
+            <p:extLst>
+              <p:ext uri="{D42A27DB-BD31-4B8C-83A1-F6EECF244321}">
+                <p14:modId xmlns:p14="http://schemas.microsoft.com/office/powerpoint/2010/main" val="2500067996"/>
+              </p:ext>
+            </p:extLst>
+          </p:nvPr>
+        </p:nvGraphicFramePr>
+        <p:xfrm>
+          <a:off x="7668768" y="1142609"/>
+          <a:ext cx="2686304" cy="2858685"/>
+        </p:xfrm>
+        <a:graphic>
+          <a:graphicData uri="http://schemas.openxmlformats.org/drawingml/2006/chart">
+            <c:chart xmlns:c="http://schemas.openxmlformats.org/drawingml/2006/chart" xmlns:r="http://schemas.openxmlformats.org/officeDocument/2006/relationships" r:id="rId3"/>
+          </a:graphicData>
+        </a:graphic>
+      </p:graphicFrame>
     </p:spTree>
     <p:extLst>
       <p:ext uri="{BB962C8B-B14F-4D97-AF65-F5344CB8AC3E}">

</xml_diff>

<commit_message>
add modules (l_plot, Path) and speaker notes about decision tree
</commit_message>
<xml_diff>
--- a/Titanic/presentation/CASINFE2018 Presentation Team Rose and Jack.pptx
+++ b/Titanic/presentation/CASINFE2018 Presentation Team Rose and Jack.pptx
@@ -189,7 +189,7 @@
 <file path=ppt/charts/chart1.xml><?xml version="1.0" encoding="utf-8"?>
 <c:chartSpace xmlns:c="http://schemas.openxmlformats.org/drawingml/2006/chart" xmlns:a="http://schemas.openxmlformats.org/drawingml/2006/main" xmlns:r="http://schemas.openxmlformats.org/officeDocument/2006/relationships" xmlns:c16r2="http://schemas.microsoft.com/office/drawing/2015/06/chart">
   <c:date1904 val="0"/>
-  <c:lang val="de-DE"/>
+  <c:lang val="en-US"/>
   <c:roundedCorners val="0"/>
   <mc:AlternateContent xmlns:mc="http://schemas.openxmlformats.org/markup-compatibility/2006">
     <mc:Choice xmlns:c14="http://schemas.microsoft.com/office/drawing/2007/8/2/chart" Requires="c14">
@@ -358,7 +358,7 @@
                 <a:cs typeface="+mn-cs"/>
               </a:defRPr>
             </a:pPr>
-            <a:endParaRPr lang="de-DE"/>
+            <a:endParaRPr lang="en-US"/>
           </a:p>
         </c:txPr>
         <c:crossAx val="388071000"/>
@@ -418,7 +418,7 @@
                 <a:cs typeface="+mn-cs"/>
               </a:defRPr>
             </a:pPr>
-            <a:endParaRPr lang="de-DE"/>
+            <a:endParaRPr lang="en-US"/>
           </a:p>
         </c:txPr>
         <c:crossAx val="388073296"/>
@@ -458,7 +458,7 @@
       <a:pPr>
         <a:defRPr/>
       </a:pPr>
-      <a:endParaRPr lang="de-DE"/>
+      <a:endParaRPr lang="en-US"/>
     </a:p>
   </c:txPr>
   <c:externalData r:id="rId3">
@@ -1105,7 +1105,7 @@
           <a:p>
             <a:fld id="{4EB46E73-0DA3-DD46-84A0-BE93D3EF7A04}" type="datetimeFigureOut">
               <a:rPr lang="en-US" smtClean="0"/>
-              <a:t>11/2/2018</a:t>
+              <a:t>11/4/18</a:t>
             </a:fld>
             <a:endParaRPr lang="en-US"/>
           </a:p>
@@ -1263,7 +1263,7 @@
           <a:p>
             <a:fld id="{534446F7-47C8-D749-9650-54055906893F}" type="slidenum">
               <a:rPr lang="en-US" smtClean="0"/>
-              <a:t>‹Nr.›</a:t>
+              <a:t>‹#›</a:t>
             </a:fld>
             <a:endParaRPr lang="en-US"/>
           </a:p>
@@ -1418,15 +1418,7 @@
           <a:p>
             <a:r>
               <a:rPr lang="en-US" dirty="0"/>
-              <a:t>- We found </a:t>
-            </a:r>
-            <a:r>
-              <a:rPr lang="en-US" dirty="0" err="1"/>
-              <a:t>algo’s</a:t>
-            </a:r>
-            <a:r>
-              <a:rPr lang="en-US" dirty="0"/>
-              <a:t> that </a:t>
+              <a:t>¨</a:t>
             </a:r>
           </a:p>
         </p:txBody>
@@ -1458,6 +1450,378 @@
     <p:extLst>
       <p:ext uri="{BB962C8B-B14F-4D97-AF65-F5344CB8AC3E}">
         <p14:creationId xmlns:p14="http://schemas.microsoft.com/office/powerpoint/2010/main" val="3239731687"/>
+      </p:ext>
+    </p:extLst>
+  </p:cSld>
+  <p:clrMapOvr>
+    <a:masterClrMapping/>
+  </p:clrMapOvr>
+</p:notes>
+</file>
+
+<file path=ppt/notesSlides/notesSlide2.xml><?xml version="1.0" encoding="utf-8"?>
+<p:notes xmlns:a="http://schemas.openxmlformats.org/drawingml/2006/main" xmlns:r="http://schemas.openxmlformats.org/officeDocument/2006/relationships" xmlns:p="http://schemas.openxmlformats.org/presentationml/2006/main">
+  <p:cSld>
+    <p:spTree>
+      <p:nvGrpSpPr>
+        <p:cNvPr id="1" name=""/>
+        <p:cNvGrpSpPr/>
+        <p:nvPr/>
+      </p:nvGrpSpPr>
+      <p:grpSpPr>
+        <a:xfrm>
+          <a:off x="0" y="0"/>
+          <a:ext cx="0" cy="0"/>
+          <a:chOff x="0" y="0"/>
+          <a:chExt cx="0" cy="0"/>
+        </a:xfrm>
+      </p:grpSpPr>
+      <p:sp>
+        <p:nvSpPr>
+          <p:cNvPr id="2" name="Slide Image Placeholder 1"/>
+          <p:cNvSpPr>
+            <a:spLocks noGrp="1" noRot="1" noChangeAspect="1"/>
+          </p:cNvSpPr>
+          <p:nvPr>
+            <p:ph type="sldImg"/>
+          </p:nvPr>
+        </p:nvSpPr>
+        <p:spPr/>
+      </p:sp>
+      <p:sp>
+        <p:nvSpPr>
+          <p:cNvPr id="3" name="Notes Placeholder 2"/>
+          <p:cNvSpPr>
+            <a:spLocks noGrp="1"/>
+          </p:cNvSpPr>
+          <p:nvPr>
+            <p:ph type="body" idx="1"/>
+          </p:nvPr>
+        </p:nvSpPr>
+        <p:spPr/>
+        <p:txBody>
+          <a:bodyPr/>
+          <a:lstStyle/>
+          <a:p>
+            <a:r>
+              <a:rPr lang="en-US" sz="1200" b="0" i="0" u="none" strike="noStrike" kern="1200" dirty="0">
+                <a:solidFill>
+                  <a:schemeClr val="tx1"/>
+                </a:solidFill>
+                <a:effectLst/>
+                <a:latin typeface="+mn-lt"/>
+                <a:ea typeface="+mn-ea"/>
+                <a:cs typeface="+mn-cs"/>
+              </a:rPr>
+              <a:t>Decision Trees:</a:t>
+            </a:r>
+          </a:p>
+          <a:p>
+            <a:endParaRPr lang="en-US" sz="1200" b="0" i="0" u="none" strike="noStrike" kern="1200" dirty="0">
+              <a:solidFill>
+                <a:schemeClr val="tx1"/>
+              </a:solidFill>
+              <a:effectLst/>
+              <a:latin typeface="+mn-lt"/>
+              <a:ea typeface="+mn-ea"/>
+              <a:cs typeface="+mn-cs"/>
+            </a:endParaRPr>
+          </a:p>
+          <a:p>
+            <a:r>
+              <a:rPr lang="en-US" sz="1200" b="0" i="0" u="none" strike="noStrike" kern="1200" dirty="0">
+                <a:solidFill>
+                  <a:schemeClr val="tx1"/>
+                </a:solidFill>
+                <a:effectLst/>
+                <a:latin typeface="+mn-lt"/>
+                <a:ea typeface="+mn-ea"/>
+                <a:cs typeface="+mn-cs"/>
+              </a:rPr>
+              <a:t>+</a:t>
+            </a:r>
+          </a:p>
+          <a:p>
+            <a:pPr marL="171450" indent="-171450">
+              <a:buFont typeface="Arial" panose="020B0604020202020204" pitchFamily="34" charset="0"/>
+              <a:buChar char="•"/>
+            </a:pPr>
+            <a:r>
+              <a:rPr lang="en-US" sz="1200" b="0" i="0" u="none" strike="noStrike" kern="1200" dirty="0">
+                <a:solidFill>
+                  <a:schemeClr val="tx1"/>
+                </a:solidFill>
+                <a:effectLst/>
+                <a:latin typeface="+mn-lt"/>
+                <a:ea typeface="+mn-ea"/>
+                <a:cs typeface="+mn-cs"/>
+              </a:rPr>
+              <a:t>Simple to understand and to interpret. Trees can be </a:t>
+            </a:r>
+            <a:r>
+              <a:rPr lang="en-US" sz="1200" b="0" i="0" u="none" strike="noStrike" kern="1200" dirty="0" err="1">
+                <a:solidFill>
+                  <a:schemeClr val="tx1"/>
+                </a:solidFill>
+                <a:effectLst/>
+                <a:latin typeface="+mn-lt"/>
+                <a:ea typeface="+mn-ea"/>
+                <a:cs typeface="+mn-cs"/>
+              </a:rPr>
+              <a:t>visualised</a:t>
+            </a:r>
+            <a:r>
+              <a:rPr lang="en-US" sz="1200" b="0" i="0" u="none" strike="noStrike" kern="1200" dirty="0">
+                <a:solidFill>
+                  <a:schemeClr val="tx1"/>
+                </a:solidFill>
+                <a:effectLst/>
+                <a:latin typeface="+mn-lt"/>
+                <a:ea typeface="+mn-ea"/>
+                <a:cs typeface="+mn-cs"/>
+              </a:rPr>
+              <a:t>.</a:t>
+            </a:r>
+          </a:p>
+          <a:p>
+            <a:pPr marL="171450" indent="-171450">
+              <a:buFont typeface="Arial" panose="020B0604020202020204" pitchFamily="34" charset="0"/>
+              <a:buChar char="•"/>
+            </a:pPr>
+            <a:r>
+              <a:rPr lang="en-US" sz="1200" b="0" i="0" u="none" strike="noStrike" kern="1200" dirty="0">
+                <a:solidFill>
+                  <a:schemeClr val="tx1"/>
+                </a:solidFill>
+                <a:effectLst/>
+                <a:latin typeface="+mn-lt"/>
+                <a:ea typeface="+mn-ea"/>
+                <a:cs typeface="+mn-cs"/>
+              </a:rPr>
+              <a:t>Requires little data preparation. Other techniques often require data </a:t>
+            </a:r>
+            <a:r>
+              <a:rPr lang="en-US" sz="1200" b="0" i="0" u="none" strike="noStrike" kern="1200" dirty="0" err="1">
+                <a:solidFill>
+                  <a:schemeClr val="tx1"/>
+                </a:solidFill>
+                <a:effectLst/>
+                <a:latin typeface="+mn-lt"/>
+                <a:ea typeface="+mn-ea"/>
+                <a:cs typeface="+mn-cs"/>
+              </a:rPr>
+              <a:t>normalisation</a:t>
+            </a:r>
+            <a:r>
+              <a:rPr lang="en-US" sz="1200" b="0" i="0" u="none" strike="noStrike" kern="1200" dirty="0">
+                <a:solidFill>
+                  <a:schemeClr val="tx1"/>
+                </a:solidFill>
+                <a:effectLst/>
+                <a:latin typeface="+mn-lt"/>
+                <a:ea typeface="+mn-ea"/>
+                <a:cs typeface="+mn-cs"/>
+              </a:rPr>
+              <a:t>, dummy variables need to be created and blank values to be removed.</a:t>
+            </a:r>
+          </a:p>
+          <a:p>
+            <a:pPr marL="171450" indent="-171450">
+              <a:buFont typeface="Arial" panose="020B0604020202020204" pitchFamily="34" charset="0"/>
+              <a:buChar char="•"/>
+            </a:pPr>
+            <a:r>
+              <a:rPr lang="en-US" sz="1200" b="0" i="0" u="none" strike="noStrike" kern="1200" dirty="0">
+                <a:solidFill>
+                  <a:schemeClr val="tx1"/>
+                </a:solidFill>
+                <a:effectLst/>
+                <a:latin typeface="+mn-lt"/>
+                <a:ea typeface="+mn-ea"/>
+                <a:cs typeface="+mn-cs"/>
+              </a:rPr>
+              <a:t>Performs well even if its assumptions are somewhat violated by the true model from which the data were generated</a:t>
+            </a:r>
+          </a:p>
+          <a:p>
+            <a:pPr marL="171450" indent="-171450">
+              <a:buFont typeface="Arial" panose="020B0604020202020204" pitchFamily="34" charset="0"/>
+              <a:buChar char="•"/>
+            </a:pPr>
+            <a:r>
+              <a:rPr lang="en-US" sz="1200" b="0" i="0" u="none" strike="noStrike" kern="1200" dirty="0">
+                <a:solidFill>
+                  <a:schemeClr val="tx1"/>
+                </a:solidFill>
+                <a:effectLst/>
+                <a:latin typeface="+mn-lt"/>
+                <a:ea typeface="+mn-ea"/>
+                <a:cs typeface="+mn-cs"/>
+              </a:rPr>
+              <a:t>Uses a white box model. If a given situation is observable in a model, the explanation for the condition is easily explained by </a:t>
+            </a:r>
+            <a:r>
+              <a:rPr lang="en-US" sz="1200" b="0" i="0" u="none" strike="noStrike" kern="1200" dirty="0" err="1">
+                <a:solidFill>
+                  <a:schemeClr val="tx1"/>
+                </a:solidFill>
+                <a:effectLst/>
+                <a:latin typeface="+mn-lt"/>
+                <a:ea typeface="+mn-ea"/>
+                <a:cs typeface="+mn-cs"/>
+              </a:rPr>
+              <a:t>boolean</a:t>
+            </a:r>
+            <a:r>
+              <a:rPr lang="en-US" sz="1200" b="0" i="0" u="none" strike="noStrike" kern="1200" dirty="0">
+                <a:solidFill>
+                  <a:schemeClr val="tx1"/>
+                </a:solidFill>
+                <a:effectLst/>
+                <a:latin typeface="+mn-lt"/>
+                <a:ea typeface="+mn-ea"/>
+                <a:cs typeface="+mn-cs"/>
+              </a:rPr>
+              <a:t> logic. By contrast, in a black box model (e.g., in an artificial neural network), results may be more difficult to interpret</a:t>
+            </a:r>
+          </a:p>
+          <a:p>
+            <a:endParaRPr lang="en-US" sz="1200" b="0" i="0" u="none" strike="noStrike" kern="1200" dirty="0">
+              <a:solidFill>
+                <a:schemeClr val="tx1"/>
+              </a:solidFill>
+              <a:effectLst/>
+              <a:latin typeface="+mn-lt"/>
+              <a:ea typeface="+mn-ea"/>
+              <a:cs typeface="+mn-cs"/>
+            </a:endParaRPr>
+          </a:p>
+          <a:p>
+            <a:endParaRPr lang="en-US" sz="1200" b="0" i="0" u="none" strike="noStrike" kern="1200" dirty="0">
+              <a:solidFill>
+                <a:schemeClr val="tx1"/>
+              </a:solidFill>
+              <a:effectLst/>
+              <a:latin typeface="+mn-lt"/>
+              <a:ea typeface="+mn-ea"/>
+              <a:cs typeface="+mn-cs"/>
+            </a:endParaRPr>
+          </a:p>
+          <a:p>
+            <a:endParaRPr lang="en-US" sz="1200" b="0" i="0" u="none" strike="noStrike" kern="1200" dirty="0">
+              <a:solidFill>
+                <a:schemeClr val="tx1"/>
+              </a:solidFill>
+              <a:effectLst/>
+              <a:latin typeface="+mn-lt"/>
+              <a:ea typeface="+mn-ea"/>
+              <a:cs typeface="+mn-cs"/>
+            </a:endParaRPr>
+          </a:p>
+          <a:p>
+            <a:r>
+              <a:rPr lang="en-US" sz="1200" b="0" i="0" u="none" strike="noStrike" kern="1200" dirty="0">
+                <a:solidFill>
+                  <a:schemeClr val="tx1"/>
+                </a:solidFill>
+                <a:effectLst/>
+                <a:latin typeface="+mn-lt"/>
+                <a:ea typeface="+mn-ea"/>
+                <a:cs typeface="+mn-cs"/>
+              </a:rPr>
+              <a:t>-</a:t>
+            </a:r>
+          </a:p>
+          <a:p>
+            <a:pPr marL="171450" indent="-171450">
+              <a:buFont typeface="Arial" panose="020B0604020202020204" pitchFamily="34" charset="0"/>
+              <a:buChar char="•"/>
+            </a:pPr>
+            <a:r>
+              <a:rPr lang="en-US" sz="1200" b="0" i="0" u="none" strike="noStrike" kern="1200" dirty="0">
+                <a:solidFill>
+                  <a:schemeClr val="tx1"/>
+                </a:solidFill>
+                <a:effectLst/>
+                <a:latin typeface="+mn-lt"/>
+                <a:ea typeface="+mn-ea"/>
+                <a:cs typeface="+mn-cs"/>
+              </a:rPr>
+              <a:t>Decision-tree learners can create over-complex trees that do not </a:t>
+            </a:r>
+            <a:r>
+              <a:rPr lang="en-US" sz="1200" b="0" i="0" u="none" strike="noStrike" kern="1200" dirty="0" err="1">
+                <a:solidFill>
+                  <a:schemeClr val="tx1"/>
+                </a:solidFill>
+                <a:effectLst/>
+                <a:latin typeface="+mn-lt"/>
+                <a:ea typeface="+mn-ea"/>
+                <a:cs typeface="+mn-cs"/>
+              </a:rPr>
+              <a:t>generalise</a:t>
+            </a:r>
+            <a:r>
+              <a:rPr lang="en-US" sz="1200" b="0" i="0" u="none" strike="noStrike" kern="1200" dirty="0">
+                <a:solidFill>
+                  <a:schemeClr val="tx1"/>
+                </a:solidFill>
+                <a:effectLst/>
+                <a:latin typeface="+mn-lt"/>
+                <a:ea typeface="+mn-ea"/>
+                <a:cs typeface="+mn-cs"/>
+              </a:rPr>
+              <a:t> the data well. This is called overfitting.</a:t>
+            </a:r>
+          </a:p>
+          <a:p>
+            <a:pPr marL="171450" indent="-171450">
+              <a:buFont typeface="Arial" panose="020B0604020202020204" pitchFamily="34" charset="0"/>
+              <a:buChar char="•"/>
+            </a:pPr>
+            <a:r>
+              <a:rPr lang="en-US" sz="1200" b="0" i="0" u="none" strike="noStrike" kern="1200" dirty="0">
+                <a:solidFill>
+                  <a:schemeClr val="tx1"/>
+                </a:solidFill>
+                <a:effectLst/>
+                <a:latin typeface="+mn-lt"/>
+                <a:ea typeface="+mn-ea"/>
+                <a:cs typeface="+mn-cs"/>
+              </a:rPr>
+              <a:t>Decision tree learners create biased trees if some classes dominate. It is therefore recommended to balance the dataset prior to fitting with the decision tree</a:t>
+            </a:r>
+            <a:endParaRPr lang="en-US" dirty="0"/>
+          </a:p>
+        </p:txBody>
+      </p:sp>
+      <p:sp>
+        <p:nvSpPr>
+          <p:cNvPr id="4" name="Slide Number Placeholder 3"/>
+          <p:cNvSpPr>
+            <a:spLocks noGrp="1"/>
+          </p:cNvSpPr>
+          <p:nvPr>
+            <p:ph type="sldNum" sz="quarter" idx="5"/>
+          </p:nvPr>
+        </p:nvSpPr>
+        <p:spPr/>
+        <p:txBody>
+          <a:bodyPr/>
+          <a:lstStyle/>
+          <a:p>
+            <a:fld id="{534446F7-47C8-D749-9650-54055906893F}" type="slidenum">
+              <a:rPr lang="en-US" smtClean="0"/>
+              <a:t>4</a:t>
+            </a:fld>
+            <a:endParaRPr lang="en-US"/>
+          </a:p>
+        </p:txBody>
+      </p:sp>
+    </p:spTree>
+    <p:extLst>
+      <p:ext uri="{BB962C8B-B14F-4D97-AF65-F5344CB8AC3E}">
+        <p14:creationId xmlns:p14="http://schemas.microsoft.com/office/powerpoint/2010/main" val="4134726814"/>
       </p:ext>
     </p:extLst>
   </p:cSld>
@@ -1614,7 +1978,7 @@
           <a:p>
             <a:fld id="{9A2B2A1C-1DF2-1B4B-B7DD-698848C29C1C}" type="datetime3">
               <a:rPr lang="en-US" smtClean="0"/>
-              <a:t>2 November 2018</a:t>
+              <a:t>4 November 2018</a:t>
             </a:fld>
             <a:endParaRPr lang="en-US"/>
           </a:p>
@@ -1671,7 +2035,7 @@
           <a:p>
             <a:fld id="{BA12F91E-B0A1-014C-A1C8-3D5E51C1A17C}" type="slidenum">
               <a:rPr lang="en-US" smtClean="0"/>
-              <a:t>‹Nr.›</a:t>
+              <a:t>‹#›</a:t>
             </a:fld>
             <a:endParaRPr lang="en-US"/>
           </a:p>
@@ -1815,7 +2179,7 @@
           <a:p>
             <a:fld id="{CA24091D-8067-9940-89DC-3EE21E9081F0}" type="datetime3">
               <a:rPr lang="en-US" smtClean="0"/>
-              <a:t>2 November 2018</a:t>
+              <a:t>4 November 2018</a:t>
             </a:fld>
             <a:endParaRPr lang="en-US"/>
           </a:p>
@@ -1872,7 +2236,7 @@
           <a:p>
             <a:fld id="{BA12F91E-B0A1-014C-A1C8-3D5E51C1A17C}" type="slidenum">
               <a:rPr lang="en-US" smtClean="0"/>
-              <a:t>‹Nr.›</a:t>
+              <a:t>‹#›</a:t>
             </a:fld>
             <a:endParaRPr lang="en-US"/>
           </a:p>
@@ -2026,7 +2390,7 @@
           <a:p>
             <a:fld id="{2E53E440-D541-454C-B969-8C951984ACCB}" type="datetime3">
               <a:rPr lang="en-US" smtClean="0"/>
-              <a:t>2 November 2018</a:t>
+              <a:t>4 November 2018</a:t>
             </a:fld>
             <a:endParaRPr lang="en-US"/>
           </a:p>
@@ -2083,7 +2447,7 @@
           <a:p>
             <a:fld id="{BA12F91E-B0A1-014C-A1C8-3D5E51C1A17C}" type="slidenum">
               <a:rPr lang="en-US" smtClean="0"/>
-              <a:t>‹Nr.›</a:t>
+              <a:t>‹#›</a:t>
             </a:fld>
             <a:endParaRPr lang="en-US"/>
           </a:p>
@@ -2227,7 +2591,7 @@
           <a:p>
             <a:fld id="{BDEB6667-082C-6442-B428-AAE56B1010DF}" type="datetime3">
               <a:rPr lang="en-US" smtClean="0"/>
-              <a:t>2 November 2018</a:t>
+              <a:t>4 November 2018</a:t>
             </a:fld>
             <a:endParaRPr lang="en-US"/>
           </a:p>
@@ -2284,7 +2648,7 @@
           <a:p>
             <a:fld id="{BA12F91E-B0A1-014C-A1C8-3D5E51C1A17C}" type="slidenum">
               <a:rPr lang="en-US" smtClean="0"/>
-              <a:t>‹Nr.›</a:t>
+              <a:t>‹#›</a:t>
             </a:fld>
             <a:endParaRPr lang="en-US"/>
           </a:p>
@@ -2505,7 +2869,7 @@
           <a:p>
             <a:fld id="{82E468DE-5BC0-2F46-8E9E-439D32D45DE9}" type="datetime3">
               <a:rPr lang="en-US" smtClean="0"/>
-              <a:t>2 November 2018</a:t>
+              <a:t>4 November 2018</a:t>
             </a:fld>
             <a:endParaRPr lang="en-US"/>
           </a:p>
@@ -2562,7 +2926,7 @@
           <a:p>
             <a:fld id="{BA12F91E-B0A1-014C-A1C8-3D5E51C1A17C}" type="slidenum">
               <a:rPr lang="en-US" smtClean="0"/>
-              <a:t>‹Nr.›</a:t>
+              <a:t>‹#›</a:t>
             </a:fld>
             <a:endParaRPr lang="en-US"/>
           </a:p>
@@ -2773,7 +3137,7 @@
           <a:p>
             <a:fld id="{192CF205-FBA2-9941-9C1F-90C83896CA55}" type="datetime3">
               <a:rPr lang="en-US" smtClean="0"/>
-              <a:t>2 November 2018</a:t>
+              <a:t>4 November 2018</a:t>
             </a:fld>
             <a:endParaRPr lang="en-US"/>
           </a:p>
@@ -2830,7 +3194,7 @@
           <a:p>
             <a:fld id="{BA12F91E-B0A1-014C-A1C8-3D5E51C1A17C}" type="slidenum">
               <a:rPr lang="en-US" smtClean="0"/>
-              <a:t>‹Nr.›</a:t>
+              <a:t>‹#›</a:t>
             </a:fld>
             <a:endParaRPr lang="en-US"/>
           </a:p>
@@ -3188,7 +3552,7 @@
           <a:p>
             <a:fld id="{511E9CDC-985E-1F41-AE50-C9884EAB9E4C}" type="datetime3">
               <a:rPr lang="en-US" smtClean="0"/>
-              <a:t>2 November 2018</a:t>
+              <a:t>4 November 2018</a:t>
             </a:fld>
             <a:endParaRPr lang="en-US"/>
           </a:p>
@@ -3245,7 +3609,7 @@
           <a:p>
             <a:fld id="{BA12F91E-B0A1-014C-A1C8-3D5E51C1A17C}" type="slidenum">
               <a:rPr lang="en-US" smtClean="0"/>
-              <a:t>‹Nr.›</a:t>
+              <a:t>‹#›</a:t>
             </a:fld>
             <a:endParaRPr lang="en-US"/>
           </a:p>
@@ -3332,7 +3696,7 @@
           <a:p>
             <a:fld id="{0959E070-C445-134A-96D7-AAC67A60A3AD}" type="datetime3">
               <a:rPr lang="en-US" smtClean="0"/>
-              <a:t>2 November 2018</a:t>
+              <a:t>4 November 2018</a:t>
             </a:fld>
             <a:endParaRPr lang="en-US"/>
           </a:p>
@@ -3389,7 +3753,7 @@
           <a:p>
             <a:fld id="{BA12F91E-B0A1-014C-A1C8-3D5E51C1A17C}" type="slidenum">
               <a:rPr lang="en-US" smtClean="0"/>
-              <a:t>‹Nr.›</a:t>
+              <a:t>‹#›</a:t>
             </a:fld>
             <a:endParaRPr lang="en-US"/>
           </a:p>
@@ -3448,7 +3812,7 @@
           <a:p>
             <a:fld id="{7E315F64-BB67-5A4C-B166-63448222AC7F}" type="datetime3">
               <a:rPr lang="en-US" smtClean="0"/>
-              <a:t>2 November 2018</a:t>
+              <a:t>4 November 2018</a:t>
             </a:fld>
             <a:endParaRPr lang="en-US"/>
           </a:p>
@@ -3505,7 +3869,7 @@
           <a:p>
             <a:fld id="{BA12F91E-B0A1-014C-A1C8-3D5E51C1A17C}" type="slidenum">
               <a:rPr lang="en-US" smtClean="0"/>
-              <a:t>‹Nr.›</a:t>
+              <a:t>‹#›</a:t>
             </a:fld>
             <a:endParaRPr lang="en-US"/>
           </a:p>
@@ -3762,7 +4126,7 @@
           <a:p>
             <a:fld id="{85E71DF1-2ADF-5D47-818D-0CA7E21A5EAE}" type="datetime3">
               <a:rPr lang="en-US" smtClean="0"/>
-              <a:t>2 November 2018</a:t>
+              <a:t>4 November 2018</a:t>
             </a:fld>
             <a:endParaRPr lang="en-US"/>
           </a:p>
@@ -3819,7 +4183,7 @@
           <a:p>
             <a:fld id="{BA12F91E-B0A1-014C-A1C8-3D5E51C1A17C}" type="slidenum">
               <a:rPr lang="en-US" smtClean="0"/>
-              <a:t>‹Nr.›</a:t>
+              <a:t>‹#›</a:t>
             </a:fld>
             <a:endParaRPr lang="en-US"/>
           </a:p>
@@ -4053,7 +4417,7 @@
           <a:p>
             <a:fld id="{DDD1EC1F-3659-754E-95EF-D2900082E2CF}" type="datetime3">
               <a:rPr lang="en-US" smtClean="0"/>
-              <a:t>2 November 2018</a:t>
+              <a:t>4 November 2018</a:t>
             </a:fld>
             <a:endParaRPr lang="en-US"/>
           </a:p>
@@ -4110,7 +4474,7 @@
           <a:p>
             <a:fld id="{BA12F91E-B0A1-014C-A1C8-3D5E51C1A17C}" type="slidenum">
               <a:rPr lang="en-US" smtClean="0"/>
-              <a:t>‹Nr.›</a:t>
+              <a:t>‹#›</a:t>
             </a:fld>
             <a:endParaRPr lang="en-US"/>
           </a:p>
@@ -4297,7 +4661,7 @@
           <a:p>
             <a:fld id="{48B59355-3524-3844-B802-72D7EC83B8B3}" type="datetime3">
               <a:rPr lang="en-US" smtClean="0"/>
-              <a:t>2 November 2018</a:t>
+              <a:t>4 November 2018</a:t>
             </a:fld>
             <a:endParaRPr lang="en-US"/>
           </a:p>
@@ -4390,7 +4754,7 @@
           <a:p>
             <a:fld id="{BA12F91E-B0A1-014C-A1C8-3D5E51C1A17C}" type="slidenum">
               <a:rPr lang="en-US" smtClean="0"/>
-              <a:t>‹Nr.›</a:t>
+              <a:t>‹#›</a:t>
             </a:fld>
             <a:endParaRPr lang="en-US"/>
           </a:p>
@@ -5000,7 +5364,7 @@
           <a:p>
             <a:fld id="{BDEB6667-082C-6442-B428-AAE56B1010DF}" type="datetime3">
               <a:rPr lang="en-US" smtClean="0"/>
-              <a:t>2 November 2018</a:t>
+              <a:t>4 November 2018</a:t>
             </a:fld>
             <a:endParaRPr lang="en-US"/>
           </a:p>
@@ -5424,6 +5788,24 @@
             </a:r>
           </a:p>
           <a:p>
+            <a:pPr lvl="1"/>
+            <a:r>
+              <a:rPr lang="en-US" dirty="0" err="1"/>
+              <a:t>l_plot</a:t>
+            </a:r>
+            <a:r>
+              <a:rPr lang="en-US" dirty="0"/>
+              <a:t> (self-written for all plotting tasks)</a:t>
+            </a:r>
+          </a:p>
+          <a:p>
+            <a:pPr lvl="1"/>
+            <a:r>
+              <a:rPr lang="en-US" dirty="0"/>
+              <a:t>Path (to make code OS independent)</a:t>
+            </a:r>
+          </a:p>
+          <a:p>
             <a:r>
               <a:rPr lang="en-US" dirty="0" err="1"/>
               <a:t>Algo</a:t>
@@ -5498,7 +5880,7 @@
           <a:p>
             <a:fld id="{BDEB6667-082C-6442-B428-AAE56B1010DF}" type="datetime3">
               <a:rPr lang="en-US" smtClean="0"/>
-              <a:t>2 November 2018</a:t>
+              <a:t>4 November 2018</a:t>
             </a:fld>
             <a:endParaRPr lang="en-US"/>
           </a:p>
@@ -5683,6 +6065,12 @@
           <a:p>
             <a:r>
               <a:rPr lang="en-US" dirty="0"/>
+              <a:t>Make code OS agnostic (file paths)</a:t>
+            </a:r>
+          </a:p>
+          <a:p>
+            <a:r>
+              <a:rPr lang="en-US" dirty="0"/>
               <a:t>Taking time to understand results</a:t>
             </a:r>
           </a:p>
@@ -5711,7 +6099,7 @@
           <a:p>
             <a:fld id="{BDEB6667-082C-6442-B428-AAE56B1010DF}" type="datetime3">
               <a:rPr lang="en-US" smtClean="0"/>
-              <a:t>2 November 2018</a:t>
+              <a:t>4 November 2018</a:t>
             </a:fld>
             <a:endParaRPr lang="en-US"/>
           </a:p>

</xml_diff>

<commit_message>
adjusted slide 3 (analysis tasks)
</commit_message>
<xml_diff>
--- a/Titanic/presentation/CASINFE2018 Presentation Team Rose and Jack.pptx
+++ b/Titanic/presentation/CASINFE2018 Presentation Team Rose and Jack.pptx
@@ -1105,7 +1105,7 @@
           <a:p>
             <a:fld id="{4EB46E73-0DA3-DD46-84A0-BE93D3EF7A04}" type="datetimeFigureOut">
               <a:rPr lang="en-US" smtClean="0"/>
-              <a:t>11/4/18</a:t>
+              <a:t>11/5/18</a:t>
             </a:fld>
             <a:endParaRPr lang="en-US"/>
           </a:p>
@@ -1978,7 +1978,7 @@
           <a:p>
             <a:fld id="{9A2B2A1C-1DF2-1B4B-B7DD-698848C29C1C}" type="datetime3">
               <a:rPr lang="en-US" smtClean="0"/>
-              <a:t>4 November 2018</a:t>
+              <a:t>5 November 2018</a:t>
             </a:fld>
             <a:endParaRPr lang="en-US"/>
           </a:p>
@@ -2179,7 +2179,7 @@
           <a:p>
             <a:fld id="{CA24091D-8067-9940-89DC-3EE21E9081F0}" type="datetime3">
               <a:rPr lang="en-US" smtClean="0"/>
-              <a:t>4 November 2018</a:t>
+              <a:t>5 November 2018</a:t>
             </a:fld>
             <a:endParaRPr lang="en-US"/>
           </a:p>
@@ -2390,7 +2390,7 @@
           <a:p>
             <a:fld id="{2E53E440-D541-454C-B969-8C951984ACCB}" type="datetime3">
               <a:rPr lang="en-US" smtClean="0"/>
-              <a:t>4 November 2018</a:t>
+              <a:t>5 November 2018</a:t>
             </a:fld>
             <a:endParaRPr lang="en-US"/>
           </a:p>
@@ -2591,7 +2591,7 @@
           <a:p>
             <a:fld id="{BDEB6667-082C-6442-B428-AAE56B1010DF}" type="datetime3">
               <a:rPr lang="en-US" smtClean="0"/>
-              <a:t>4 November 2018</a:t>
+              <a:t>5 November 2018</a:t>
             </a:fld>
             <a:endParaRPr lang="en-US"/>
           </a:p>
@@ -2869,7 +2869,7 @@
           <a:p>
             <a:fld id="{82E468DE-5BC0-2F46-8E9E-439D32D45DE9}" type="datetime3">
               <a:rPr lang="en-US" smtClean="0"/>
-              <a:t>4 November 2018</a:t>
+              <a:t>5 November 2018</a:t>
             </a:fld>
             <a:endParaRPr lang="en-US"/>
           </a:p>
@@ -3137,7 +3137,7 @@
           <a:p>
             <a:fld id="{192CF205-FBA2-9941-9C1F-90C83896CA55}" type="datetime3">
               <a:rPr lang="en-US" smtClean="0"/>
-              <a:t>4 November 2018</a:t>
+              <a:t>5 November 2018</a:t>
             </a:fld>
             <a:endParaRPr lang="en-US"/>
           </a:p>
@@ -3552,7 +3552,7 @@
           <a:p>
             <a:fld id="{511E9CDC-985E-1F41-AE50-C9884EAB9E4C}" type="datetime3">
               <a:rPr lang="en-US" smtClean="0"/>
-              <a:t>4 November 2018</a:t>
+              <a:t>5 November 2018</a:t>
             </a:fld>
             <a:endParaRPr lang="en-US"/>
           </a:p>
@@ -3696,7 +3696,7 @@
           <a:p>
             <a:fld id="{0959E070-C445-134A-96D7-AAC67A60A3AD}" type="datetime3">
               <a:rPr lang="en-US" smtClean="0"/>
-              <a:t>4 November 2018</a:t>
+              <a:t>5 November 2018</a:t>
             </a:fld>
             <a:endParaRPr lang="en-US"/>
           </a:p>
@@ -3812,7 +3812,7 @@
           <a:p>
             <a:fld id="{7E315F64-BB67-5A4C-B166-63448222AC7F}" type="datetime3">
               <a:rPr lang="en-US" smtClean="0"/>
-              <a:t>4 November 2018</a:t>
+              <a:t>5 November 2018</a:t>
             </a:fld>
             <a:endParaRPr lang="en-US"/>
           </a:p>
@@ -4126,7 +4126,7 @@
           <a:p>
             <a:fld id="{85E71DF1-2ADF-5D47-818D-0CA7E21A5EAE}" type="datetime3">
               <a:rPr lang="en-US" smtClean="0"/>
-              <a:t>4 November 2018</a:t>
+              <a:t>5 November 2018</a:t>
             </a:fld>
             <a:endParaRPr lang="en-US"/>
           </a:p>
@@ -4417,7 +4417,7 @@
           <a:p>
             <a:fld id="{DDD1EC1F-3659-754E-95EF-D2900082E2CF}" type="datetime3">
               <a:rPr lang="en-US" smtClean="0"/>
-              <a:t>4 November 2018</a:t>
+              <a:t>5 November 2018</a:t>
             </a:fld>
             <a:endParaRPr lang="en-US"/>
           </a:p>
@@ -4661,7 +4661,7 @@
           <a:p>
             <a:fld id="{48B59355-3524-3844-B802-72D7EC83B8B3}" type="datetime3">
               <a:rPr lang="en-US" smtClean="0"/>
-              <a:t>4 November 2018</a:t>
+              <a:t>5 November 2018</a:t>
             </a:fld>
             <a:endParaRPr lang="en-US"/>
           </a:p>
@@ -5364,7 +5364,7 @@
           <a:p>
             <a:fld id="{BDEB6667-082C-6442-B428-AAE56B1010DF}" type="datetime3">
               <a:rPr lang="en-US" smtClean="0"/>
-              <a:t>4 November 2018</a:t>
+              <a:t>5 November 2018</a:t>
             </a:fld>
             <a:endParaRPr lang="en-US"/>
           </a:p>
@@ -5795,7 +5795,7 @@
             </a:r>
             <a:r>
               <a:rPr lang="en-US" dirty="0"/>
-              <a:t> (self-written for all plotting tasks)</a:t>
+              <a:t> (self-written for all plotting &amp; analysis tasks)</a:t>
             </a:r>
           </a:p>
           <a:p>
@@ -5880,7 +5880,7 @@
           <a:p>
             <a:fld id="{BDEB6667-082C-6442-B428-AAE56B1010DF}" type="datetime3">
               <a:rPr lang="en-US" smtClean="0"/>
-              <a:t>4 November 2018</a:t>
+              <a:t>5 November 2018</a:t>
             </a:fld>
             <a:endParaRPr lang="en-US"/>
           </a:p>
@@ -5956,14 +5956,14 @@
           <p:nvPr>
             <p:extLst>
               <p:ext uri="{D42A27DB-BD31-4B8C-83A1-F6EECF244321}">
-                <p14:modId xmlns:p14="http://schemas.microsoft.com/office/powerpoint/2010/main" val="2500067996"/>
+                <p14:modId xmlns:p14="http://schemas.microsoft.com/office/powerpoint/2010/main" val="437211358"/>
               </p:ext>
             </p:extLst>
           </p:nvPr>
         </p:nvGraphicFramePr>
         <p:xfrm>
-          <a:off x="7668768" y="1142609"/>
-          <a:ext cx="2686304" cy="2858685"/>
+          <a:off x="8011667" y="1142609"/>
+          <a:ext cx="3124419" cy="2858685"/>
         </p:xfrm>
         <a:graphic>
           <a:graphicData uri="http://schemas.openxmlformats.org/drawingml/2006/chart">
@@ -6099,7 +6099,7 @@
           <a:p>
             <a:fld id="{BDEB6667-082C-6442-B428-AAE56B1010DF}" type="datetime3">
               <a:rPr lang="en-US" smtClean="0"/>
-              <a:t>4 November 2018</a:t>
+              <a:t>5 November 2018</a:t>
             </a:fld>
             <a:endParaRPr lang="en-US"/>
           </a:p>

</xml_diff>

<commit_message>
adjusted slides with input for presentation
</commit_message>
<xml_diff>
--- a/Titanic/presentation/CASINFE2018 Presentation Team Rose and Jack.pptx
+++ b/Titanic/presentation/CASINFE2018 Presentation Team Rose and Jack.pptx
@@ -6048,8 +6048,23 @@
         </p:nvSpPr>
         <p:spPr/>
         <p:txBody>
-          <a:bodyPr/>
-          <a:lstStyle/>
+          <a:bodyPr>
+            <a:normAutofit/>
+          </a:bodyPr>
+          <a:lstStyle/>
+          <a:p>
+            <a:r>
+              <a:rPr lang="en-US" dirty="0"/>
+              <a:t>Initially had 3 different approaches, as team decided to go with decision tree =&gt; not a black box</a:t>
+            </a:r>
+          </a:p>
+          <a:p>
+            <a:r>
+              <a:rPr lang="en-US"/>
+              <a:t>Taking time to understand results</a:t>
+            </a:r>
+            <a:endParaRPr lang="en-US" dirty="0"/>
+          </a:p>
           <a:p>
             <a:r>
               <a:rPr lang="en-US" dirty="0"/>
@@ -6063,15 +6078,42 @@
             </a:r>
           </a:p>
           <a:p>
+            <a:pPr lvl="1"/>
+            <a:r>
+              <a:rPr lang="en-US" dirty="0"/>
+              <a:t>Isa focused on the graphics and analysis part</a:t>
+            </a:r>
+          </a:p>
+          <a:p>
+            <a:pPr lvl="1"/>
+            <a:r>
+              <a:rPr lang="en-US" dirty="0" err="1"/>
+              <a:t>Reto</a:t>
+            </a:r>
+            <a:r>
+              <a:rPr lang="en-US" dirty="0"/>
+              <a:t> focused on the data cleansing</a:t>
+            </a:r>
+          </a:p>
+          <a:p>
+            <a:pPr lvl="1"/>
+            <a:r>
+              <a:rPr lang="en-US" dirty="0"/>
+              <a:t>Andreas focused on the code clean up and </a:t>
+            </a:r>
+            <a:r>
+              <a:rPr lang="en-US" dirty="0" err="1"/>
+              <a:t>os</a:t>
+            </a:r>
+            <a:r>
+              <a:rPr lang="en-US" dirty="0"/>
+              <a:t> independent parts</a:t>
+            </a:r>
+          </a:p>
+          <a:p>
             <a:r>
               <a:rPr lang="en-US" dirty="0"/>
               <a:t>Make code OS agnostic (file paths)</a:t>
-            </a:r>
-          </a:p>
-          <a:p>
-            <a:r>
-              <a:rPr lang="en-US" dirty="0"/>
-              <a:t>Taking time to understand results</a:t>
             </a:r>
           </a:p>
         </p:txBody>

</xml_diff>

<commit_message>
added slack on learnings
</commit_message>
<xml_diff>
--- a/Titanic/presentation/CASINFE2018 Presentation Team Rose and Jack.pptx
+++ b/Titanic/presentation/CASINFE2018 Presentation Team Rose and Jack.pptx
@@ -6049,7 +6049,7 @@
         <p:spPr/>
         <p:txBody>
           <a:bodyPr>
-            <a:normAutofit/>
+            <a:normAutofit lnSpcReduction="10000"/>
           </a:bodyPr>
           <a:lstStyle/>
           <a:p>
@@ -6060,10 +6060,9 @@
           </a:p>
           <a:p>
             <a:r>
-              <a:rPr lang="en-US"/>
+              <a:rPr lang="en-US" dirty="0"/>
               <a:t>Taking time to understand results</a:t>
             </a:r>
-            <a:endParaRPr lang="en-US" dirty="0"/>
           </a:p>
           <a:p>
             <a:r>
@@ -6109,6 +6108,14 @@
               <a:rPr lang="en-US" dirty="0"/>
               <a:t> independent parts</a:t>
             </a:r>
+          </a:p>
+          <a:p>
+            <a:pPr lvl="1"/>
+            <a:r>
+              <a:rPr lang="en-US"/>
+              <a:t>Coordination via Slack</a:t>
+            </a:r>
+            <a:endParaRPr lang="en-US" dirty="0"/>
           </a:p>
           <a:p>
             <a:r>

</xml_diff>